<commit_message>
evidencias y ppt finalizado
</commit_message>
<xml_diff>
--- a/Proyecto App Móviles.pptx
+++ b/Proyecto App Móviles.pptx
@@ -9,12 +9,14 @@
     <p:sldId id="257" r:id="rId3"/>
     <p:sldId id="258" r:id="rId4"/>
     <p:sldId id="259" r:id="rId5"/>
-    <p:sldId id="260" r:id="rId6"/>
-    <p:sldId id="262" r:id="rId7"/>
-    <p:sldId id="264" r:id="rId8"/>
-    <p:sldId id="263" r:id="rId9"/>
-    <p:sldId id="266" r:id="rId10"/>
-    <p:sldId id="267" r:id="rId11"/>
+    <p:sldId id="266" r:id="rId6"/>
+    <p:sldId id="268" r:id="rId7"/>
+    <p:sldId id="274" r:id="rId8"/>
+    <p:sldId id="269" r:id="rId9"/>
+    <p:sldId id="271" r:id="rId10"/>
+    <p:sldId id="273" r:id="rId11"/>
+    <p:sldId id="270" r:id="rId12"/>
+    <p:sldId id="272" r:id="rId13"/>
   </p:sldIdLst>
   <p:sldSz cx="12192000" cy="6858000"/>
   <p:notesSz cx="6858000" cy="9144000"/>
@@ -113,6 +115,11 @@
       </a:defRPr>
     </a:lvl9pPr>
   </p:defaultTextStyle>
+  <p:extLst>
+    <p:ext uri="{EFAFB233-063F-42B5-8137-9DF3F51BA10A}">
+      <p15:sldGuideLst xmlns:p15="http://schemas.microsoft.com/office/powerpoint/2012/main"/>
+    </p:ext>
+  </p:extLst>
 </p:presentation>
 </file>
 
@@ -5970,35 +5977,753 @@
           <a:chExt cx="0" cy="0"/>
         </a:xfrm>
       </p:grpSpPr>
-      <p:sp>
-        <p:nvSpPr>
-          <p:cNvPr id="2" name="Título 1">
+      <p:pic>
+        <p:nvPicPr>
+          <p:cNvPr id="3" name="Imagen 2">
             <a:extLst>
               <a:ext uri="{FF2B5EF4-FFF2-40B4-BE49-F238E27FC236}">
-                <a16:creationId xmlns:a16="http://schemas.microsoft.com/office/drawing/2014/main" id="{23EE9CEF-3458-7902-3804-91ECFEDB4F28}"/>
+                <a16:creationId xmlns:a16="http://schemas.microsoft.com/office/drawing/2014/main" id="{24116E12-5D0F-6F21-1635-F9EC629E3681}"/>
               </a:ext>
             </a:extLst>
           </p:cNvPr>
-          <p:cNvSpPr>
-            <a:spLocks noGrp="1"/>
-          </p:cNvSpPr>
-          <p:nvPr>
-            <p:ph type="title"/>
-          </p:nvPr>
-        </p:nvSpPr>
-        <p:spPr/>
-        <p:txBody>
-          <a:bodyPr/>
-          <a:lstStyle/>
-          <a:p>
-            <a:endParaRPr lang="es-PE" dirty="0"/>
+          <p:cNvPicPr>
+            <a:picLocks noChangeAspect="1"/>
+          </p:cNvPicPr>
+          <p:nvPr/>
+        </p:nvPicPr>
+        <p:blipFill>
+          <a:blip r:embed="rId2"/>
+          <a:stretch>
+            <a:fillRect/>
+          </a:stretch>
+        </p:blipFill>
+        <p:spPr>
+          <a:xfrm>
+            <a:off x="1866938" y="1099126"/>
+            <a:ext cx="2226600" cy="4447309"/>
+          </a:xfrm>
+          <a:prstGeom prst="rect">
+            <a:avLst/>
+          </a:prstGeom>
+        </p:spPr>
+      </p:pic>
+      <p:pic>
+        <p:nvPicPr>
+          <p:cNvPr id="5" name="Imagen 4">
+            <a:extLst>
+              <a:ext uri="{FF2B5EF4-FFF2-40B4-BE49-F238E27FC236}">
+                <a16:creationId xmlns:a16="http://schemas.microsoft.com/office/drawing/2014/main" id="{9C6E80DC-2B9D-252A-4C3D-D610A1106CA7}"/>
+              </a:ext>
+            </a:extLst>
+          </p:cNvPr>
+          <p:cNvPicPr>
+            <a:picLocks noChangeAspect="1"/>
+          </p:cNvPicPr>
+          <p:nvPr/>
+        </p:nvPicPr>
+        <p:blipFill>
+          <a:blip r:embed="rId3"/>
+          <a:stretch>
+            <a:fillRect/>
+          </a:stretch>
+        </p:blipFill>
+        <p:spPr>
+          <a:xfrm>
+            <a:off x="4948689" y="1099126"/>
+            <a:ext cx="2294622" cy="4447309"/>
+          </a:xfrm>
+          <a:prstGeom prst="rect">
+            <a:avLst/>
+          </a:prstGeom>
+        </p:spPr>
+      </p:pic>
+      <p:pic>
+        <p:nvPicPr>
+          <p:cNvPr id="7" name="Imagen 6">
+            <a:extLst>
+              <a:ext uri="{FF2B5EF4-FFF2-40B4-BE49-F238E27FC236}">
+                <a16:creationId xmlns:a16="http://schemas.microsoft.com/office/drawing/2014/main" id="{944D4970-7E60-3C2C-57D2-04C5B4816D71}"/>
+              </a:ext>
+            </a:extLst>
+          </p:cNvPr>
+          <p:cNvPicPr>
+            <a:picLocks noChangeAspect="1"/>
+          </p:cNvPicPr>
+          <p:nvPr/>
+        </p:nvPicPr>
+        <p:blipFill>
+          <a:blip r:embed="rId4"/>
+          <a:stretch>
+            <a:fillRect/>
+          </a:stretch>
+        </p:blipFill>
+        <p:spPr>
+          <a:xfrm>
+            <a:off x="7938675" y="1099126"/>
+            <a:ext cx="2294622" cy="4449824"/>
+          </a:xfrm>
+          <a:prstGeom prst="rect">
+            <a:avLst/>
+          </a:prstGeom>
+        </p:spPr>
+      </p:pic>
+      <p:sp>
+        <p:nvSpPr>
+          <p:cNvPr id="8" name="Rectángulo 7">
+            <a:extLst>
+              <a:ext uri="{FF2B5EF4-FFF2-40B4-BE49-F238E27FC236}">
+                <a16:creationId xmlns:a16="http://schemas.microsoft.com/office/drawing/2014/main" id="{AAC33D98-5B5D-DF98-8021-5B701CD40857}"/>
+              </a:ext>
+            </a:extLst>
+          </p:cNvPr>
+          <p:cNvSpPr/>
+          <p:nvPr/>
+        </p:nvSpPr>
+        <p:spPr>
+          <a:xfrm>
+            <a:off x="2043720" y="5546435"/>
+            <a:ext cx="1956691" cy="461665"/>
+          </a:xfrm>
+          <a:prstGeom prst="rect">
+            <a:avLst/>
+          </a:prstGeom>
+          <a:noFill/>
+        </p:spPr>
+        <p:txBody>
+          <a:bodyPr wrap="none" lIns="91440" tIns="45720" rIns="91440" bIns="45720">
+            <a:spAutoFit/>
+          </a:bodyPr>
+          <a:lstStyle/>
+          <a:p>
+            <a:pPr algn="ctr"/>
+            <a:r>
+              <a:rPr lang="es-ES" sz="2400" b="0" cap="none" spc="0" dirty="0">
+                <a:ln w="0"/>
+                <a:solidFill>
+                  <a:schemeClr val="tx1"/>
+                </a:solidFill>
+                <a:effectLst>
+                  <a:outerShdw blurRad="38100" dist="19050" dir="2700000" algn="tl" rotWithShape="0">
+                    <a:schemeClr val="dk1">
+                      <a:alpha val="40000"/>
+                    </a:schemeClr>
+                  </a:outerShdw>
+                </a:effectLst>
+              </a:rPr>
+              <a:t>Agregar tarjeta</a:t>
+            </a:r>
+          </a:p>
+        </p:txBody>
+      </p:sp>
+      <p:sp>
+        <p:nvSpPr>
+          <p:cNvPr id="9" name="Rectángulo 8">
+            <a:extLst>
+              <a:ext uri="{FF2B5EF4-FFF2-40B4-BE49-F238E27FC236}">
+                <a16:creationId xmlns:a16="http://schemas.microsoft.com/office/drawing/2014/main" id="{D0809AC9-64EE-5A89-E215-067F05F45207}"/>
+              </a:ext>
+            </a:extLst>
+          </p:cNvPr>
+          <p:cNvSpPr/>
+          <p:nvPr/>
+        </p:nvSpPr>
+        <p:spPr>
+          <a:xfrm>
+            <a:off x="4982555" y="5603249"/>
+            <a:ext cx="2226893" cy="461665"/>
+          </a:xfrm>
+          <a:prstGeom prst="rect">
+            <a:avLst/>
+          </a:prstGeom>
+          <a:noFill/>
+        </p:spPr>
+        <p:txBody>
+          <a:bodyPr wrap="none" lIns="91440" tIns="45720" rIns="91440" bIns="45720">
+            <a:spAutoFit/>
+          </a:bodyPr>
+          <a:lstStyle/>
+          <a:p>
+            <a:pPr algn="ctr"/>
+            <a:r>
+              <a:rPr lang="es-ES" sz="2400" b="0" cap="none" spc="0" dirty="0">
+                <a:ln w="0"/>
+                <a:solidFill>
+                  <a:schemeClr val="tx1"/>
+                </a:solidFill>
+                <a:effectLst>
+                  <a:outerShdw blurRad="38100" dist="19050" dir="2700000" algn="tl" rotWithShape="0">
+                    <a:schemeClr val="dk1">
+                      <a:alpha val="40000"/>
+                    </a:schemeClr>
+                  </a:outerShdw>
+                </a:effectLst>
+              </a:rPr>
+              <a:t>Llenado de datos</a:t>
+            </a:r>
+          </a:p>
+        </p:txBody>
+      </p:sp>
+      <p:sp>
+        <p:nvSpPr>
+          <p:cNvPr id="10" name="Rectángulo 9">
+            <a:extLst>
+              <a:ext uri="{FF2B5EF4-FFF2-40B4-BE49-F238E27FC236}">
+                <a16:creationId xmlns:a16="http://schemas.microsoft.com/office/drawing/2014/main" id="{04F43F3C-4968-2850-AEE4-A4F76352A20D}"/>
+              </a:ext>
+            </a:extLst>
+          </p:cNvPr>
+          <p:cNvSpPr/>
+          <p:nvPr/>
+        </p:nvSpPr>
+        <p:spPr>
+          <a:xfrm>
+            <a:off x="8018225" y="5603249"/>
+            <a:ext cx="2135521" cy="461665"/>
+          </a:xfrm>
+          <a:prstGeom prst="rect">
+            <a:avLst/>
+          </a:prstGeom>
+          <a:noFill/>
+        </p:spPr>
+        <p:txBody>
+          <a:bodyPr wrap="none" lIns="91440" tIns="45720" rIns="91440" bIns="45720">
+            <a:spAutoFit/>
+          </a:bodyPr>
+          <a:lstStyle/>
+          <a:p>
+            <a:pPr algn="ctr"/>
+            <a:r>
+              <a:rPr lang="es-ES" sz="2400" b="0" cap="none" spc="0" dirty="0">
+                <a:ln w="0"/>
+                <a:solidFill>
+                  <a:schemeClr val="tx1"/>
+                </a:solidFill>
+                <a:effectLst>
+                  <a:outerShdw blurRad="38100" dist="19050" dir="2700000" algn="tl" rotWithShape="0">
+                    <a:schemeClr val="dk1">
+                      <a:alpha val="40000"/>
+                    </a:schemeClr>
+                  </a:outerShdw>
+                </a:effectLst>
+              </a:rPr>
+              <a:t>Tarjeta agregada</a:t>
+            </a:r>
           </a:p>
         </p:txBody>
       </p:sp>
     </p:spTree>
     <p:extLst>
       <p:ext uri="{BB962C8B-B14F-4D97-AF65-F5344CB8AC3E}">
-        <p14:creationId xmlns:p14="http://schemas.microsoft.com/office/powerpoint/2010/main" val="950434588"/>
+        <p14:creationId xmlns:p14="http://schemas.microsoft.com/office/powerpoint/2010/main" val="3524936537"/>
+      </p:ext>
+    </p:extLst>
+  </p:cSld>
+  <p:clrMapOvr>
+    <a:masterClrMapping/>
+  </p:clrMapOvr>
+</p:sld>
+</file>
+
+<file path=ppt/slides/slide11.xml><?xml version="1.0" encoding="utf-8"?>
+<p:sld xmlns:a="http://schemas.openxmlformats.org/drawingml/2006/main" xmlns:r="http://schemas.openxmlformats.org/officeDocument/2006/relationships" xmlns:p="http://schemas.openxmlformats.org/presentationml/2006/main">
+  <p:cSld>
+    <p:spTree>
+      <p:nvGrpSpPr>
+        <p:cNvPr id="1" name=""/>
+        <p:cNvGrpSpPr/>
+        <p:nvPr/>
+      </p:nvGrpSpPr>
+      <p:grpSpPr>
+        <a:xfrm>
+          <a:off x="0" y="0"/>
+          <a:ext cx="0" cy="0"/>
+          <a:chOff x="0" y="0"/>
+          <a:chExt cx="0" cy="0"/>
+        </a:xfrm>
+      </p:grpSpPr>
+      <p:pic>
+        <p:nvPicPr>
+          <p:cNvPr id="3" name="Imagen 2">
+            <a:extLst>
+              <a:ext uri="{FF2B5EF4-FFF2-40B4-BE49-F238E27FC236}">
+                <a16:creationId xmlns:a16="http://schemas.microsoft.com/office/drawing/2014/main" id="{FDC29B43-A87C-45ED-E400-C8297C2435E3}"/>
+              </a:ext>
+            </a:extLst>
+          </p:cNvPr>
+          <p:cNvPicPr>
+            <a:picLocks noChangeAspect="1"/>
+          </p:cNvPicPr>
+          <p:nvPr/>
+        </p:nvPicPr>
+        <p:blipFill>
+          <a:blip r:embed="rId2"/>
+          <a:stretch>
+            <a:fillRect/>
+          </a:stretch>
+        </p:blipFill>
+        <p:spPr>
+          <a:xfrm>
+            <a:off x="2620362" y="1019091"/>
+            <a:ext cx="2404719" cy="4493491"/>
+          </a:xfrm>
+          <a:prstGeom prst="rect">
+            <a:avLst/>
+          </a:prstGeom>
+        </p:spPr>
+      </p:pic>
+      <p:pic>
+        <p:nvPicPr>
+          <p:cNvPr id="9" name="Imagen 8">
+            <a:extLst>
+              <a:ext uri="{FF2B5EF4-FFF2-40B4-BE49-F238E27FC236}">
+                <a16:creationId xmlns:a16="http://schemas.microsoft.com/office/drawing/2014/main" id="{2A3AD024-AA21-AF44-DA4F-48B51A5D1226}"/>
+              </a:ext>
+            </a:extLst>
+          </p:cNvPr>
+          <p:cNvPicPr>
+            <a:picLocks noChangeAspect="1"/>
+          </p:cNvPicPr>
+          <p:nvPr/>
+        </p:nvPicPr>
+        <p:blipFill>
+          <a:blip r:embed="rId3"/>
+          <a:stretch>
+            <a:fillRect/>
+          </a:stretch>
+        </p:blipFill>
+        <p:spPr>
+          <a:xfrm>
+            <a:off x="7166920" y="1157637"/>
+            <a:ext cx="2220619" cy="4354945"/>
+          </a:xfrm>
+          <a:prstGeom prst="rect">
+            <a:avLst/>
+          </a:prstGeom>
+        </p:spPr>
+      </p:pic>
+      <p:sp>
+        <p:nvSpPr>
+          <p:cNvPr id="12" name="Rectángulo 11">
+            <a:extLst>
+              <a:ext uri="{FF2B5EF4-FFF2-40B4-BE49-F238E27FC236}">
+                <a16:creationId xmlns:a16="http://schemas.microsoft.com/office/drawing/2014/main" id="{44950C06-16D6-BCFC-0DD4-94D4DF4441A8}"/>
+              </a:ext>
+            </a:extLst>
+          </p:cNvPr>
+          <p:cNvSpPr/>
+          <p:nvPr/>
+        </p:nvSpPr>
+        <p:spPr>
+          <a:xfrm>
+            <a:off x="2707610" y="5512582"/>
+            <a:ext cx="2329228" cy="461665"/>
+          </a:xfrm>
+          <a:prstGeom prst="rect">
+            <a:avLst/>
+          </a:prstGeom>
+          <a:noFill/>
+        </p:spPr>
+        <p:txBody>
+          <a:bodyPr wrap="none" lIns="91440" tIns="45720" rIns="91440" bIns="45720">
+            <a:spAutoFit/>
+          </a:bodyPr>
+          <a:lstStyle/>
+          <a:p>
+            <a:pPr algn="ctr"/>
+            <a:r>
+              <a:rPr lang="es-ES" sz="2400" b="0" cap="none" spc="0" dirty="0">
+                <a:ln w="0"/>
+                <a:solidFill>
+                  <a:schemeClr val="tx1"/>
+                </a:solidFill>
+                <a:effectLst>
+                  <a:outerShdw blurRad="38100" dist="19050" dir="2700000" algn="tl" rotWithShape="0">
+                    <a:schemeClr val="dk1">
+                      <a:alpha val="40000"/>
+                    </a:schemeClr>
+                  </a:outerShdw>
+                </a:effectLst>
+              </a:rPr>
+              <a:t>Menú desplegable</a:t>
+            </a:r>
+          </a:p>
+        </p:txBody>
+      </p:sp>
+      <p:sp>
+        <p:nvSpPr>
+          <p:cNvPr id="13" name="Rectángulo 12">
+            <a:extLst>
+              <a:ext uri="{FF2B5EF4-FFF2-40B4-BE49-F238E27FC236}">
+                <a16:creationId xmlns:a16="http://schemas.microsoft.com/office/drawing/2014/main" id="{D1F97B4F-9DA3-23EE-9B68-C92D30CD82BB}"/>
+              </a:ext>
+            </a:extLst>
+          </p:cNvPr>
+          <p:cNvSpPr/>
+          <p:nvPr/>
+        </p:nvSpPr>
+        <p:spPr>
+          <a:xfrm>
+            <a:off x="6554383" y="5512582"/>
+            <a:ext cx="3187347" cy="461665"/>
+          </a:xfrm>
+          <a:prstGeom prst="rect">
+            <a:avLst/>
+          </a:prstGeom>
+          <a:noFill/>
+        </p:spPr>
+        <p:txBody>
+          <a:bodyPr wrap="none" lIns="91440" tIns="45720" rIns="91440" bIns="45720">
+            <a:spAutoFit/>
+          </a:bodyPr>
+          <a:lstStyle/>
+          <a:p>
+            <a:pPr algn="ctr"/>
+            <a:r>
+              <a:rPr lang="es-ES" sz="2400" b="0" cap="none" spc="0" dirty="0">
+                <a:ln w="0"/>
+                <a:solidFill>
+                  <a:schemeClr val="tx1"/>
+                </a:solidFill>
+                <a:effectLst>
+                  <a:outerShdw blurRad="38100" dist="19050" dir="2700000" algn="tl" rotWithShape="0">
+                    <a:schemeClr val="dk1">
+                      <a:alpha val="40000"/>
+                    </a:schemeClr>
+                  </a:outerShdw>
+                </a:effectLst>
+              </a:rPr>
+              <a:t>Carrito de compras </a:t>
+            </a:r>
+            <a:r>
+              <a:rPr lang="es-ES" sz="2400" b="0" cap="none" spc="0" dirty="0" err="1">
+                <a:ln w="0"/>
+                <a:solidFill>
+                  <a:schemeClr val="tx1"/>
+                </a:solidFill>
+                <a:effectLst>
+                  <a:outerShdw blurRad="38100" dist="19050" dir="2700000" algn="tl" rotWithShape="0">
+                    <a:schemeClr val="dk1">
+                      <a:alpha val="40000"/>
+                    </a:schemeClr>
+                  </a:outerShdw>
+                </a:effectLst>
+              </a:rPr>
+              <a:t>vacio</a:t>
+            </a:r>
+            <a:endParaRPr lang="es-ES" sz="2400" b="0" cap="none" spc="0" dirty="0">
+              <a:ln w="0"/>
+              <a:solidFill>
+                <a:schemeClr val="tx1"/>
+              </a:solidFill>
+              <a:effectLst>
+                <a:outerShdw blurRad="38100" dist="19050" dir="2700000" algn="tl" rotWithShape="0">
+                  <a:schemeClr val="dk1">
+                    <a:alpha val="40000"/>
+                  </a:schemeClr>
+                </a:outerShdw>
+              </a:effectLst>
+            </a:endParaRPr>
+          </a:p>
+        </p:txBody>
+      </p:sp>
+    </p:spTree>
+    <p:extLst>
+      <p:ext uri="{BB962C8B-B14F-4D97-AF65-F5344CB8AC3E}">
+        <p14:creationId xmlns:p14="http://schemas.microsoft.com/office/powerpoint/2010/main" val="856789745"/>
+      </p:ext>
+    </p:extLst>
+  </p:cSld>
+  <p:clrMapOvr>
+    <a:masterClrMapping/>
+  </p:clrMapOvr>
+</p:sld>
+</file>
+
+<file path=ppt/slides/slide12.xml><?xml version="1.0" encoding="utf-8"?>
+<p:sld xmlns:a="http://schemas.openxmlformats.org/drawingml/2006/main" xmlns:r="http://schemas.openxmlformats.org/officeDocument/2006/relationships" xmlns:p="http://schemas.openxmlformats.org/presentationml/2006/main">
+  <p:cSld>
+    <p:spTree>
+      <p:nvGrpSpPr>
+        <p:cNvPr id="1" name=""/>
+        <p:cNvGrpSpPr/>
+        <p:nvPr/>
+      </p:nvGrpSpPr>
+      <p:grpSpPr>
+        <a:xfrm>
+          <a:off x="0" y="0"/>
+          <a:ext cx="0" cy="0"/>
+          <a:chOff x="0" y="0"/>
+          <a:chExt cx="0" cy="0"/>
+        </a:xfrm>
+      </p:grpSpPr>
+      <p:pic>
+        <p:nvPicPr>
+          <p:cNvPr id="2" name="Imagen 1">
+            <a:extLst>
+              <a:ext uri="{FF2B5EF4-FFF2-40B4-BE49-F238E27FC236}">
+                <a16:creationId xmlns:a16="http://schemas.microsoft.com/office/drawing/2014/main" id="{5B8535D2-E083-27DB-EF53-06CA6B6CDD59}"/>
+              </a:ext>
+            </a:extLst>
+          </p:cNvPr>
+          <p:cNvPicPr>
+            <a:picLocks noChangeAspect="1"/>
+          </p:cNvPicPr>
+          <p:nvPr/>
+        </p:nvPicPr>
+        <p:blipFill>
+          <a:blip r:embed="rId2"/>
+          <a:stretch>
+            <a:fillRect/>
+          </a:stretch>
+        </p:blipFill>
+        <p:spPr>
+          <a:xfrm>
+            <a:off x="5058747" y="1112982"/>
+            <a:ext cx="2285125" cy="4493491"/>
+          </a:xfrm>
+          <a:prstGeom prst="rect">
+            <a:avLst/>
+          </a:prstGeom>
+        </p:spPr>
+      </p:pic>
+      <p:pic>
+        <p:nvPicPr>
+          <p:cNvPr id="4" name="Imagen 3">
+            <a:extLst>
+              <a:ext uri="{FF2B5EF4-FFF2-40B4-BE49-F238E27FC236}">
+                <a16:creationId xmlns:a16="http://schemas.microsoft.com/office/drawing/2014/main" id="{FA23B7DC-D360-AE00-44C5-4A9D6C13F0A0}"/>
+              </a:ext>
+            </a:extLst>
+          </p:cNvPr>
+          <p:cNvPicPr>
+            <a:picLocks noChangeAspect="1"/>
+          </p:cNvPicPr>
+          <p:nvPr/>
+        </p:nvPicPr>
+        <p:blipFill>
+          <a:blip r:embed="rId3"/>
+          <a:stretch>
+            <a:fillRect/>
+          </a:stretch>
+        </p:blipFill>
+        <p:spPr>
+          <a:xfrm>
+            <a:off x="1873409" y="1112982"/>
+            <a:ext cx="2285125" cy="4570250"/>
+          </a:xfrm>
+          <a:prstGeom prst="rect">
+            <a:avLst/>
+          </a:prstGeom>
+        </p:spPr>
+      </p:pic>
+      <p:pic>
+        <p:nvPicPr>
+          <p:cNvPr id="5" name="Imagen 4">
+            <a:extLst>
+              <a:ext uri="{FF2B5EF4-FFF2-40B4-BE49-F238E27FC236}">
+                <a16:creationId xmlns:a16="http://schemas.microsoft.com/office/drawing/2014/main" id="{8924C80A-55D9-9A88-366E-0B622665471B}"/>
+              </a:ext>
+            </a:extLst>
+          </p:cNvPr>
+          <p:cNvPicPr>
+            <a:picLocks noChangeAspect="1"/>
+          </p:cNvPicPr>
+          <p:nvPr/>
+        </p:nvPicPr>
+        <p:blipFill>
+          <a:blip r:embed="rId4"/>
+          <a:stretch>
+            <a:fillRect/>
+          </a:stretch>
+        </p:blipFill>
+        <p:spPr>
+          <a:xfrm>
+            <a:off x="8244086" y="1136071"/>
+            <a:ext cx="2320962" cy="4428305"/>
+          </a:xfrm>
+          <a:prstGeom prst="rect">
+            <a:avLst/>
+          </a:prstGeom>
+        </p:spPr>
+      </p:pic>
+      <p:sp>
+        <p:nvSpPr>
+          <p:cNvPr id="6" name="Rectángulo 5">
+            <a:extLst>
+              <a:ext uri="{FF2B5EF4-FFF2-40B4-BE49-F238E27FC236}">
+                <a16:creationId xmlns:a16="http://schemas.microsoft.com/office/drawing/2014/main" id="{7955B3C8-F1B7-48DD-D7E9-51F3AEDD2A66}"/>
+              </a:ext>
+            </a:extLst>
+          </p:cNvPr>
+          <p:cNvSpPr/>
+          <p:nvPr/>
+        </p:nvSpPr>
+        <p:spPr>
+          <a:xfrm>
+            <a:off x="1621612" y="5735329"/>
+            <a:ext cx="2832828" cy="461665"/>
+          </a:xfrm>
+          <a:prstGeom prst="rect">
+            <a:avLst/>
+          </a:prstGeom>
+          <a:noFill/>
+        </p:spPr>
+        <p:txBody>
+          <a:bodyPr wrap="none" lIns="91440" tIns="45720" rIns="91440" bIns="45720">
+            <a:spAutoFit/>
+          </a:bodyPr>
+          <a:lstStyle/>
+          <a:p>
+            <a:pPr algn="ctr"/>
+            <a:r>
+              <a:rPr lang="es-ES" sz="2400" dirty="0">
+                <a:ln w="0"/>
+                <a:effectLst>
+                  <a:outerShdw blurRad="38100" dist="19050" dir="2700000" algn="tl" rotWithShape="0">
+                    <a:schemeClr val="dk1">
+                      <a:alpha val="40000"/>
+                    </a:schemeClr>
+                  </a:outerShdw>
+                </a:effectLst>
+              </a:rPr>
+              <a:t>Selección de producto</a:t>
+            </a:r>
+            <a:endParaRPr lang="es-ES" sz="2400" b="0" cap="none" spc="0" dirty="0">
+              <a:ln w="0"/>
+              <a:solidFill>
+                <a:schemeClr val="tx1"/>
+              </a:solidFill>
+              <a:effectLst>
+                <a:outerShdw blurRad="38100" dist="19050" dir="2700000" algn="tl" rotWithShape="0">
+                  <a:schemeClr val="dk1">
+                    <a:alpha val="40000"/>
+                  </a:schemeClr>
+                </a:outerShdw>
+              </a:effectLst>
+            </a:endParaRPr>
+          </a:p>
+        </p:txBody>
+      </p:sp>
+      <p:sp>
+        <p:nvSpPr>
+          <p:cNvPr id="7" name="Rectángulo 6">
+            <a:extLst>
+              <a:ext uri="{FF2B5EF4-FFF2-40B4-BE49-F238E27FC236}">
+                <a16:creationId xmlns:a16="http://schemas.microsoft.com/office/drawing/2014/main" id="{97F56D6F-5CFD-B771-AD7E-455FC88C6978}"/>
+              </a:ext>
+            </a:extLst>
+          </p:cNvPr>
+          <p:cNvSpPr/>
+          <p:nvPr/>
+        </p:nvSpPr>
+        <p:spPr>
+          <a:xfrm>
+            <a:off x="4850470" y="5683232"/>
+            <a:ext cx="2491068" cy="461665"/>
+          </a:xfrm>
+          <a:prstGeom prst="rect">
+            <a:avLst/>
+          </a:prstGeom>
+          <a:noFill/>
+        </p:spPr>
+        <p:txBody>
+          <a:bodyPr wrap="none" lIns="91440" tIns="45720" rIns="91440" bIns="45720">
+            <a:spAutoFit/>
+          </a:bodyPr>
+          <a:lstStyle/>
+          <a:p>
+            <a:pPr algn="ctr"/>
+            <a:r>
+              <a:rPr lang="es-ES" sz="2400" dirty="0">
+                <a:ln w="0"/>
+                <a:effectLst>
+                  <a:outerShdw blurRad="38100" dist="19050" dir="2700000" algn="tl" rotWithShape="0">
+                    <a:schemeClr val="dk1">
+                      <a:alpha val="40000"/>
+                    </a:schemeClr>
+                  </a:outerShdw>
+                </a:effectLst>
+              </a:rPr>
+              <a:t>Carrito de compras</a:t>
+            </a:r>
+            <a:endParaRPr lang="es-ES" sz="2400" b="0" cap="none" spc="0" dirty="0">
+              <a:ln w="0"/>
+              <a:solidFill>
+                <a:schemeClr val="tx1"/>
+              </a:solidFill>
+              <a:effectLst>
+                <a:outerShdw blurRad="38100" dist="19050" dir="2700000" algn="tl" rotWithShape="0">
+                  <a:schemeClr val="dk1">
+                    <a:alpha val="40000"/>
+                  </a:schemeClr>
+                </a:outerShdw>
+              </a:effectLst>
+            </a:endParaRPr>
+          </a:p>
+        </p:txBody>
+      </p:sp>
+      <p:sp>
+        <p:nvSpPr>
+          <p:cNvPr id="8" name="Rectángulo 7">
+            <a:extLst>
+              <a:ext uri="{FF2B5EF4-FFF2-40B4-BE49-F238E27FC236}">
+                <a16:creationId xmlns:a16="http://schemas.microsoft.com/office/drawing/2014/main" id="{CE3BA40E-B98F-B9BA-997D-BF9CADA4525C}"/>
+              </a:ext>
+            </a:extLst>
+          </p:cNvPr>
+          <p:cNvSpPr/>
+          <p:nvPr/>
+        </p:nvSpPr>
+        <p:spPr>
+          <a:xfrm>
+            <a:off x="8190939" y="5683231"/>
+            <a:ext cx="2257157" cy="461665"/>
+          </a:xfrm>
+          <a:prstGeom prst="rect">
+            <a:avLst/>
+          </a:prstGeom>
+          <a:noFill/>
+        </p:spPr>
+        <p:txBody>
+          <a:bodyPr wrap="none" lIns="91440" tIns="45720" rIns="91440" bIns="45720">
+            <a:spAutoFit/>
+          </a:bodyPr>
+          <a:lstStyle/>
+          <a:p>
+            <a:pPr algn="ctr"/>
+            <a:r>
+              <a:rPr lang="es-ES" sz="2400" dirty="0">
+                <a:ln w="0"/>
+                <a:effectLst>
+                  <a:outerShdw blurRad="38100" dist="19050" dir="2700000" algn="tl" rotWithShape="0">
+                    <a:schemeClr val="dk1">
+                      <a:alpha val="40000"/>
+                    </a:schemeClr>
+                  </a:outerShdw>
+                </a:effectLst>
+              </a:rPr>
+              <a:t>Pago completado</a:t>
+            </a:r>
+            <a:endParaRPr lang="es-ES" sz="2400" b="0" cap="none" spc="0" dirty="0">
+              <a:ln w="0"/>
+              <a:solidFill>
+                <a:schemeClr val="tx1"/>
+              </a:solidFill>
+              <a:effectLst>
+                <a:outerShdw blurRad="38100" dist="19050" dir="2700000" algn="tl" rotWithShape="0">
+                  <a:schemeClr val="dk1">
+                    <a:alpha val="40000"/>
+                  </a:schemeClr>
+                </a:outerShdw>
+              </a:effectLst>
+            </a:endParaRPr>
+          </a:p>
+        </p:txBody>
+      </p:sp>
+    </p:spTree>
+    <p:extLst>
+      <p:ext uri="{BB962C8B-B14F-4D97-AF65-F5344CB8AC3E}">
+        <p14:creationId xmlns:p14="http://schemas.microsoft.com/office/powerpoint/2010/main" val="3129851030"/>
       </p:ext>
     </p:extLst>
   </p:cSld>
@@ -7107,866 +7832,6 @@
 </file>
 
 <file path=ppt/slides/slide5.xml><?xml version="1.0" encoding="utf-8"?>
-<p:sld xmlns:a="http://schemas.openxmlformats.org/drawingml/2006/main" xmlns:r="http://schemas.openxmlformats.org/officeDocument/2006/relationships" xmlns:p="http://schemas.openxmlformats.org/presentationml/2006/main">
-  <p:cSld>
-    <p:bg>
-      <p:bgPr>
-        <a:blipFill>
-          <a:blip r:embed="rId2"/>
-          <a:stretch/>
-        </a:blipFill>
-        <a:effectLst/>
-      </p:bgPr>
-    </p:bg>
-    <p:spTree>
-      <p:nvGrpSpPr>
-        <p:cNvPr id="1" name=""/>
-        <p:cNvGrpSpPr/>
-        <p:nvPr/>
-      </p:nvGrpSpPr>
-      <p:grpSpPr>
-        <a:xfrm>
-          <a:off x="0" y="0"/>
-          <a:ext cx="0" cy="0"/>
-          <a:chOff x="0" y="0"/>
-          <a:chExt cx="0" cy="0"/>
-        </a:xfrm>
-      </p:grpSpPr>
-      <p:grpSp>
-        <p:nvGrpSpPr>
-          <p:cNvPr id="7" name="Group 6">
-            <a:extLst>
-              <a:ext uri="{FF2B5EF4-FFF2-40B4-BE49-F238E27FC236}">
-                <a16:creationId xmlns:a16="http://schemas.microsoft.com/office/drawing/2014/main" id="{7575D7A7-3C36-4508-9BC6-70A93BD3C438}"/>
-              </a:ext>
-              <a:ext uri="{C183D7F6-B498-43B3-948B-1728B52AA6E4}">
-                <adec:decorative xmlns:adec="http://schemas.microsoft.com/office/drawing/2017/decorative" val="1"/>
-              </a:ext>
-            </a:extLst>
-          </p:cNvPr>
-          <p:cNvGrpSpPr>
-            <a:grpSpLocks noGrp="1" noUngrp="1" noRot="1" noChangeAspect="1" noMove="1" noResize="1"/>
-          </p:cNvGrpSpPr>
-          <p:nvPr>
-            <p:extLst>
-              <p:ext uri="{386F3935-93C4-4BCD-93E2-E3B085C9AB24}">
-                <p16:designElem xmlns:p16="http://schemas.microsoft.com/office/powerpoint/2015/main" val="1"/>
-              </p:ext>
-            </p:extLst>
-          </p:nvPr>
-        </p:nvGrpSpPr>
-        <p:grpSpPr>
-          <a:xfrm>
-            <a:off x="-16934" y="0"/>
-            <a:ext cx="12231160" cy="6856214"/>
-            <a:chOff x="-16934" y="0"/>
-            <a:chExt cx="12231160" cy="6856214"/>
-          </a:xfrm>
-        </p:grpSpPr>
-        <p:pic>
-          <p:nvPicPr>
-            <p:cNvPr id="8" name="Picture 7">
-              <a:extLst>
-                <a:ext uri="{FF2B5EF4-FFF2-40B4-BE49-F238E27FC236}">
-                  <a16:creationId xmlns:a16="http://schemas.microsoft.com/office/drawing/2014/main" id="{BC964A0D-06B7-4C16-AC9F-20ADDA8059EB}"/>
-                </a:ext>
-                <a:ext uri="{C183D7F6-B498-43B3-948B-1728B52AA6E4}">
-                  <adec:decorative xmlns:adec="http://schemas.microsoft.com/office/drawing/2017/decorative" val="1"/>
-                </a:ext>
-              </a:extLst>
-            </p:cNvPr>
-            <p:cNvPicPr>
-              <a:picLocks noChangeAspect="1"/>
-            </p:cNvPicPr>
-            <p:nvPr>
-              <p:extLst>
-                <p:ext uri="{386F3935-93C4-4BCD-93E2-E3B085C9AB24}">
-                  <p16:designElem xmlns:p16="http://schemas.microsoft.com/office/powerpoint/2015/main" val="1"/>
-                </p:ext>
-              </p:extLst>
-            </p:nvPr>
-          </p:nvPicPr>
-          <p:blipFill>
-            <a:blip r:embed="rId3">
-              <a:extLst>
-                <a:ext uri="{28A0092B-C50C-407E-A947-70E740481C1C}">
-                  <a14:useLocalDpi xmlns:a14="http://schemas.microsoft.com/office/drawing/2010/main" val="0"/>
-                </a:ext>
-              </a:extLst>
-            </a:blip>
-            <a:stretch>
-              <a:fillRect/>
-            </a:stretch>
-          </p:blipFill>
-          <p:spPr>
-            <a:xfrm>
-              <a:off x="0" y="0"/>
-              <a:ext cx="12188825" cy="6856214"/>
-            </a:xfrm>
-            <a:prstGeom prst="rect">
-              <a:avLst/>
-            </a:prstGeom>
-          </p:spPr>
-        </p:pic>
-        <p:sp>
-          <p:nvSpPr>
-            <p:cNvPr id="9" name="Rectangle 8">
-              <a:extLst>
-                <a:ext uri="{FF2B5EF4-FFF2-40B4-BE49-F238E27FC236}">
-                  <a16:creationId xmlns:a16="http://schemas.microsoft.com/office/drawing/2014/main" id="{F5703F5C-55DF-45CD-BC3F-3BE8F10339EE}"/>
-                </a:ext>
-                <a:ext uri="{C183D7F6-B498-43B3-948B-1728B52AA6E4}">
-                  <adec:decorative xmlns:adec="http://schemas.microsoft.com/office/drawing/2017/decorative" val="1"/>
-                </a:ext>
-              </a:extLst>
-            </p:cNvPr>
-            <p:cNvSpPr/>
-            <p:nvPr>
-              <p:extLst>
-                <p:ext uri="{386F3935-93C4-4BCD-93E2-E3B085C9AB24}">
-                  <p16:designElem xmlns:p16="http://schemas.microsoft.com/office/powerpoint/2015/main" val="1"/>
-                </p:ext>
-              </p:extLst>
-            </p:nvPr>
-          </p:nvSpPr>
-          <p:spPr>
-            <a:xfrm>
-              <a:off x="2328332" y="1540931"/>
-              <a:ext cx="7543802" cy="3835401"/>
-            </a:xfrm>
-            <a:prstGeom prst="rect">
-              <a:avLst/>
-            </a:prstGeom>
-            <a:noFill/>
-            <a:ln w="15875">
-              <a:miter lim="800000"/>
-            </a:ln>
-          </p:spPr>
-          <p:style>
-            <a:lnRef idx="1">
-              <a:schemeClr val="accent1"/>
-            </a:lnRef>
-            <a:fillRef idx="3">
-              <a:schemeClr val="accent1"/>
-            </a:fillRef>
-            <a:effectRef idx="2">
-              <a:schemeClr val="accent1"/>
-            </a:effectRef>
-            <a:fontRef idx="minor">
-              <a:schemeClr val="lt1"/>
-            </a:fontRef>
-          </p:style>
-        </p:sp>
-        <p:pic>
-          <p:nvPicPr>
-            <p:cNvPr id="10" name="Picture 9">
-              <a:extLst>
-                <a:ext uri="{FF2B5EF4-FFF2-40B4-BE49-F238E27FC236}">
-                  <a16:creationId xmlns:a16="http://schemas.microsoft.com/office/drawing/2014/main" id="{A8C7134F-70F9-4826-A97E-9B39AEA08F5B}"/>
-                </a:ext>
-                <a:ext uri="{C183D7F6-B498-43B3-948B-1728B52AA6E4}">
-                  <adec:decorative xmlns:adec="http://schemas.microsoft.com/office/drawing/2017/decorative" val="1"/>
-                </a:ext>
-              </a:extLst>
-            </p:cNvPr>
-            <p:cNvPicPr>
-              <a:picLocks noChangeAspect="1"/>
-            </p:cNvPicPr>
-            <p:nvPr>
-              <p:extLst>
-                <p:ext uri="{386F3935-93C4-4BCD-93E2-E3B085C9AB24}">
-                  <p16:designElem xmlns:p16="http://schemas.microsoft.com/office/powerpoint/2015/main" val="1"/>
-                </p:ext>
-              </p:extLst>
-            </p:nvPr>
-          </p:nvPicPr>
-          <p:blipFill rotWithShape="1">
-            <a:blip r:embed="rId4">
-              <a:extLst>
-                <a:ext uri="{28A0092B-C50C-407E-A947-70E740481C1C}">
-                  <a14:useLocalDpi xmlns:a14="http://schemas.microsoft.com/office/drawing/2010/main" val="0"/>
-                </a:ext>
-              </a:extLst>
-            </a:blip>
-            <a:srcRect/>
-            <a:stretch/>
-          </p:blipFill>
-          <p:spPr>
-            <a:xfrm>
-              <a:off x="-16934" y="3147609"/>
-              <a:ext cx="2478024" cy="612648"/>
-            </a:xfrm>
-            <a:prstGeom prst="rect">
-              <a:avLst/>
-            </a:prstGeom>
-          </p:spPr>
-        </p:pic>
-        <p:pic>
-          <p:nvPicPr>
-            <p:cNvPr id="11" name="Picture 10">
-              <a:extLst>
-                <a:ext uri="{FF2B5EF4-FFF2-40B4-BE49-F238E27FC236}">
-                  <a16:creationId xmlns:a16="http://schemas.microsoft.com/office/drawing/2014/main" id="{39351E73-B6DD-4B56-8EE9-C16B5711C46D}"/>
-                </a:ext>
-                <a:ext uri="{C183D7F6-B498-43B3-948B-1728B52AA6E4}">
-                  <adec:decorative xmlns:adec="http://schemas.microsoft.com/office/drawing/2017/decorative" val="1"/>
-                </a:ext>
-              </a:extLst>
-            </p:cNvPr>
-            <p:cNvPicPr>
-              <a:picLocks noChangeAspect="1"/>
-            </p:cNvPicPr>
-            <p:nvPr>
-              <p:extLst>
-                <p:ext uri="{386F3935-93C4-4BCD-93E2-E3B085C9AB24}">
-                  <p16:designElem xmlns:p16="http://schemas.microsoft.com/office/powerpoint/2015/main" val="1"/>
-                </p:ext>
-              </p:extLst>
-            </p:nvPr>
-          </p:nvPicPr>
-          <p:blipFill rotWithShape="1">
-            <a:blip r:embed="rId4">
-              <a:extLst>
-                <a:ext uri="{28A0092B-C50C-407E-A947-70E740481C1C}">
-                  <a14:useLocalDpi xmlns:a14="http://schemas.microsoft.com/office/drawing/2010/main" val="0"/>
-                </a:ext>
-              </a:extLst>
-            </a:blip>
-            <a:srcRect/>
-            <a:stretch/>
-          </p:blipFill>
-          <p:spPr>
-            <a:xfrm>
-              <a:off x="9736202" y="3147609"/>
-              <a:ext cx="2478024" cy="612648"/>
-            </a:xfrm>
-            <a:prstGeom prst="rect">
-              <a:avLst/>
-            </a:prstGeom>
-          </p:spPr>
-        </p:pic>
-      </p:grpSp>
-      <p:cxnSp>
-        <p:nvCxnSpPr>
-          <p:cNvPr id="13" name="Straight Connector 12">
-            <a:extLst>
-              <a:ext uri="{FF2B5EF4-FFF2-40B4-BE49-F238E27FC236}">
-                <a16:creationId xmlns:a16="http://schemas.microsoft.com/office/drawing/2014/main" id="{AE446D0E-6531-40B7-A182-FB8602439777}"/>
-              </a:ext>
-              <a:ext uri="{C183D7F6-B498-43B3-948B-1728B52AA6E4}">
-                <adec:decorative xmlns:adec="http://schemas.microsoft.com/office/drawing/2017/decorative" val="1"/>
-              </a:ext>
-            </a:extLst>
-          </p:cNvPr>
-          <p:cNvCxnSpPr>
-            <a:cxnSpLocks noGrp="1" noRot="1" noChangeAspect="1" noMove="1" noResize="1" noEditPoints="1" noAdjustHandles="1" noChangeArrowheads="1" noChangeShapeType="1"/>
-          </p:cNvCxnSpPr>
-          <p:nvPr>
-            <p:extLst>
-              <p:ext uri="{386F3935-93C4-4BCD-93E2-E3B085C9AB24}">
-                <p16:designElem xmlns:p16="http://schemas.microsoft.com/office/powerpoint/2015/main" val="1"/>
-              </p:ext>
-            </p:extLst>
-          </p:nvPr>
-        </p:nvCxnSpPr>
-        <p:spPr>
-          <a:xfrm>
-            <a:off x="2692399" y="3522131"/>
-            <a:ext cx="6815668" cy="0"/>
-          </a:xfrm>
-          <a:prstGeom prst="line">
-            <a:avLst/>
-          </a:prstGeom>
-        </p:spPr>
-        <p:style>
-          <a:lnRef idx="2">
-            <a:schemeClr val="accent1"/>
-          </a:lnRef>
-          <a:fillRef idx="0">
-            <a:schemeClr val="accent1"/>
-          </a:fillRef>
-          <a:effectRef idx="1">
-            <a:schemeClr val="accent1"/>
-          </a:effectRef>
-          <a:fontRef idx="minor">
-            <a:schemeClr val="tx1"/>
-          </a:fontRef>
-        </p:style>
-      </p:cxnSp>
-      <p:sp useBgFill="1">
-        <p:nvSpPr>
-          <p:cNvPr id="15" name="Rectangle 14">
-            <a:extLst>
-              <a:ext uri="{FF2B5EF4-FFF2-40B4-BE49-F238E27FC236}">
-                <a16:creationId xmlns:a16="http://schemas.microsoft.com/office/drawing/2014/main" id="{22C7FDF9-C2A1-45C5-A49B-8B1CA2A3C05B}"/>
-              </a:ext>
-              <a:ext uri="{C183D7F6-B498-43B3-948B-1728B52AA6E4}">
-                <adec:decorative xmlns:adec="http://schemas.microsoft.com/office/drawing/2017/decorative" val="1"/>
-              </a:ext>
-            </a:extLst>
-          </p:cNvPr>
-          <p:cNvSpPr>
-            <a:spLocks noGrp="1" noRot="1" noChangeAspect="1" noMove="1" noResize="1" noEditPoints="1" noAdjustHandles="1" noChangeArrowheads="1" noChangeShapeType="1" noTextEdit="1"/>
-          </p:cNvSpPr>
-          <p:nvPr>
-            <p:extLst>
-              <p:ext uri="{386F3935-93C4-4BCD-93E2-E3B085C9AB24}">
-                <p16:designElem xmlns:p16="http://schemas.microsoft.com/office/powerpoint/2015/main" val="1"/>
-              </p:ext>
-            </p:extLst>
-          </p:nvPr>
-        </p:nvSpPr>
-        <p:spPr>
-          <a:xfrm>
-            <a:off x="0" y="0"/>
-            <a:ext cx="12192000" cy="6858000"/>
-          </a:xfrm>
-          <a:prstGeom prst="rect">
-            <a:avLst/>
-          </a:prstGeom>
-          <a:blipFill>
-            <a:blip r:embed="rId5"/>
-            <a:stretch/>
-          </a:blipFill>
-          <a:ln w="15875" cap="flat" cmpd="sng" algn="ctr">
-            <a:solidFill>
-              <a:srgbClr val="AB946B">
-                <a:shade val="50000"/>
-              </a:srgbClr>
-            </a:solidFill>
-            <a:prstDash val="solid"/>
-          </a:ln>
-          <a:effectLst/>
-        </p:spPr>
-        <p:txBody>
-          <a:bodyPr rtlCol="0" anchor="ctr"/>
-          <a:lstStyle/>
-          <a:p>
-            <a:pPr marL="0" marR="0" lvl="0" indent="0" algn="ctr" defTabSz="914400" eaLnBrk="1" fontAlgn="auto" latinLnBrk="0" hangingPunct="1">
-              <a:lnSpc>
-                <a:spcPct val="100000"/>
-              </a:lnSpc>
-              <a:spcBef>
-                <a:spcPts val="0"/>
-              </a:spcBef>
-              <a:spcAft>
-                <a:spcPts val="0"/>
-              </a:spcAft>
-              <a:buClrTx/>
-              <a:buSzTx/>
-              <a:buFontTx/>
-              <a:buNone/>
-              <a:tabLst/>
-              <a:defRPr/>
-            </a:pPr>
-            <a:endParaRPr kumimoji="0" lang="en-US" sz="1800" b="0" i="0" u="none" strike="noStrike" kern="0" cap="none" spc="0" normalizeH="0" baseline="0" noProof="0">
-              <a:ln>
-                <a:noFill/>
-              </a:ln>
-              <a:solidFill>
-                <a:prstClr val="white"/>
-              </a:solidFill>
-              <a:effectLst/>
-              <a:uLnTx/>
-              <a:uFillTx/>
-              <a:latin typeface="Garamond" panose="02020404030301010803"/>
-              <a:ea typeface="+mn-ea"/>
-              <a:cs typeface="+mn-cs"/>
-            </a:endParaRPr>
-          </a:p>
-        </p:txBody>
-      </p:sp>
-      <p:pic>
-        <p:nvPicPr>
-          <p:cNvPr id="17" name="Picture 16">
-            <a:extLst>
-              <a:ext uri="{FF2B5EF4-FFF2-40B4-BE49-F238E27FC236}">
-                <a16:creationId xmlns:a16="http://schemas.microsoft.com/office/drawing/2014/main" id="{8D8988FF-4B5F-49A9-BB7F-B49C1610F1B4}"/>
-              </a:ext>
-              <a:ext uri="{C183D7F6-B498-43B3-948B-1728B52AA6E4}">
-                <adec:decorative xmlns:adec="http://schemas.microsoft.com/office/drawing/2017/decorative" val="1"/>
-              </a:ext>
-            </a:extLst>
-          </p:cNvPr>
-          <p:cNvPicPr>
-            <a:picLocks noGrp="1" noRot="1" noChangeAspect="1" noMove="1" noResize="1" noEditPoints="1" noAdjustHandles="1" noChangeArrowheads="1" noChangeShapeType="1" noCrop="1"/>
-          </p:cNvPicPr>
-          <p:nvPr>
-            <p:extLst>
-              <p:ext uri="{386F3935-93C4-4BCD-93E2-E3B085C9AB24}">
-                <p16:designElem xmlns:p16="http://schemas.microsoft.com/office/powerpoint/2015/main" val="1"/>
-              </p:ext>
-            </p:extLst>
-          </p:nvPr>
-        </p:nvPicPr>
-        <p:blipFill>
-          <a:blip r:embed="rId6">
-            <a:extLst>
-              <a:ext uri="{28A0092B-C50C-407E-A947-70E740481C1C}">
-                <a14:useLocalDpi xmlns:a14="http://schemas.microsoft.com/office/drawing/2010/main" val="0"/>
-              </a:ext>
-            </a:extLst>
-          </a:blip>
-          <a:stretch>
-            <a:fillRect/>
-          </a:stretch>
-        </p:blipFill>
-        <p:spPr>
-          <a:xfrm>
-            <a:off x="0" y="0"/>
-            <a:ext cx="12188825" cy="6856214"/>
-          </a:xfrm>
-          <a:prstGeom prst="rect">
-            <a:avLst/>
-          </a:prstGeom>
-        </p:spPr>
-      </p:pic>
-      <p:sp>
-        <p:nvSpPr>
-          <p:cNvPr id="2" name="Título 1">
-            <a:extLst>
-              <a:ext uri="{FF2B5EF4-FFF2-40B4-BE49-F238E27FC236}">
-                <a16:creationId xmlns:a16="http://schemas.microsoft.com/office/drawing/2014/main" id="{4C2A0096-BBC3-B396-5196-49A8CABD5D57}"/>
-              </a:ext>
-            </a:extLst>
-          </p:cNvPr>
-          <p:cNvSpPr>
-            <a:spLocks noGrp="1"/>
-          </p:cNvSpPr>
-          <p:nvPr>
-            <p:ph type="title"/>
-          </p:nvPr>
-        </p:nvSpPr>
-        <p:spPr>
-          <a:xfrm>
-            <a:off x="2692398" y="1871131"/>
-            <a:ext cx="6815669" cy="1515533"/>
-          </a:xfrm>
-        </p:spPr>
-        <p:txBody>
-          <a:bodyPr vert="horz" lIns="91440" tIns="45720" rIns="91440" bIns="45720" rtlCol="0" anchor="b">
-            <a:normAutofit/>
-          </a:bodyPr>
-          <a:lstStyle/>
-          <a:p>
-            <a:r>
-              <a:rPr lang="es-PE" sz="5000" dirty="0"/>
-              <a:t>Evidencias</a:t>
-            </a:r>
-            <a:r>
-              <a:rPr lang="en-US" sz="5000" dirty="0"/>
-              <a:t> del </a:t>
-            </a:r>
-            <a:r>
-              <a:rPr lang="es-PE" sz="5000" dirty="0"/>
-              <a:t>repositorio</a:t>
-            </a:r>
-          </a:p>
-        </p:txBody>
-      </p:sp>
-      <p:cxnSp>
-        <p:nvCxnSpPr>
-          <p:cNvPr id="19" name="Straight Connector 18">
-            <a:extLst>
-              <a:ext uri="{FF2B5EF4-FFF2-40B4-BE49-F238E27FC236}">
-                <a16:creationId xmlns:a16="http://schemas.microsoft.com/office/drawing/2014/main" id="{CE580401-353D-4D90-9CA7-316BFD718E5C}"/>
-              </a:ext>
-              <a:ext uri="{C183D7F6-B498-43B3-948B-1728B52AA6E4}">
-                <adec:decorative xmlns:adec="http://schemas.microsoft.com/office/drawing/2017/decorative" val="1"/>
-              </a:ext>
-            </a:extLst>
-          </p:cNvPr>
-          <p:cNvCxnSpPr>
-            <a:cxnSpLocks noGrp="1" noRot="1" noChangeAspect="1" noMove="1" noResize="1" noEditPoints="1" noAdjustHandles="1" noChangeArrowheads="1" noChangeShapeType="1"/>
-          </p:cNvCxnSpPr>
-          <p:nvPr>
-            <p:extLst>
-              <p:ext uri="{386F3935-93C4-4BCD-93E2-E3B085C9AB24}">
-                <p16:designElem xmlns:p16="http://schemas.microsoft.com/office/powerpoint/2015/main" val="1"/>
-              </p:ext>
-            </p:extLst>
-          </p:nvPr>
-        </p:nvCxnSpPr>
-        <p:spPr>
-          <a:xfrm>
-            <a:off x="2692399" y="3522131"/>
-            <a:ext cx="6815668" cy="0"/>
-          </a:xfrm>
-          <a:prstGeom prst="line">
-            <a:avLst/>
-          </a:prstGeom>
-        </p:spPr>
-        <p:style>
-          <a:lnRef idx="2">
-            <a:schemeClr val="accent1"/>
-          </a:lnRef>
-          <a:fillRef idx="0">
-            <a:schemeClr val="accent1"/>
-          </a:fillRef>
-          <a:effectRef idx="1">
-            <a:schemeClr val="accent1"/>
-          </a:effectRef>
-          <a:fontRef idx="minor">
-            <a:schemeClr val="tx1"/>
-          </a:fontRef>
-        </p:style>
-      </p:cxnSp>
-    </p:spTree>
-    <p:extLst>
-      <p:ext uri="{BB962C8B-B14F-4D97-AF65-F5344CB8AC3E}">
-        <p14:creationId xmlns:p14="http://schemas.microsoft.com/office/powerpoint/2010/main" val="1376484957"/>
-      </p:ext>
-    </p:extLst>
-  </p:cSld>
-  <p:clrMapOvr>
-    <a:masterClrMapping/>
-  </p:clrMapOvr>
-</p:sld>
-</file>
-
-<file path=ppt/slides/slide6.xml><?xml version="1.0" encoding="utf-8"?>
-<p:sld xmlns:a="http://schemas.openxmlformats.org/drawingml/2006/main" xmlns:r="http://schemas.openxmlformats.org/officeDocument/2006/relationships" xmlns:p="http://schemas.openxmlformats.org/presentationml/2006/main">
-  <p:cSld>
-    <p:spTree>
-      <p:nvGrpSpPr>
-        <p:cNvPr id="1" name=""/>
-        <p:cNvGrpSpPr/>
-        <p:nvPr/>
-      </p:nvGrpSpPr>
-      <p:grpSpPr>
-        <a:xfrm>
-          <a:off x="0" y="0"/>
-          <a:ext cx="0" cy="0"/>
-          <a:chOff x="0" y="0"/>
-          <a:chExt cx="0" cy="0"/>
-        </a:xfrm>
-      </p:grpSpPr>
-      <p:pic>
-        <p:nvPicPr>
-          <p:cNvPr id="3" name="Imagen 2" descr="Interfaz de usuario gráfica, Texto, Aplicación&#10;&#10;Descripción generada automáticamente">
-            <a:extLst>
-              <a:ext uri="{FF2B5EF4-FFF2-40B4-BE49-F238E27FC236}">
-                <a16:creationId xmlns:a16="http://schemas.microsoft.com/office/drawing/2014/main" id="{0E879842-324F-0B11-0457-757D3A128697}"/>
-              </a:ext>
-            </a:extLst>
-          </p:cNvPr>
-          <p:cNvPicPr>
-            <a:picLocks noChangeAspect="1"/>
-          </p:cNvPicPr>
-          <p:nvPr/>
-        </p:nvPicPr>
-        <p:blipFill>
-          <a:blip r:embed="rId2">
-            <a:extLst>
-              <a:ext uri="{28A0092B-C50C-407E-A947-70E740481C1C}">
-                <a14:useLocalDpi xmlns:a14="http://schemas.microsoft.com/office/drawing/2010/main" val="0"/>
-              </a:ext>
-            </a:extLst>
-          </a:blip>
-          <a:stretch>
-            <a:fillRect/>
-          </a:stretch>
-        </p:blipFill>
-        <p:spPr>
-          <a:xfrm>
-            <a:off x="1108363" y="969384"/>
-            <a:ext cx="9975273" cy="4543425"/>
-          </a:xfrm>
-          <a:prstGeom prst="rect">
-            <a:avLst/>
-          </a:prstGeom>
-        </p:spPr>
-      </p:pic>
-      <p:sp>
-        <p:nvSpPr>
-          <p:cNvPr id="4" name="Rectángulo 3">
-            <a:extLst>
-              <a:ext uri="{FF2B5EF4-FFF2-40B4-BE49-F238E27FC236}">
-                <a16:creationId xmlns:a16="http://schemas.microsoft.com/office/drawing/2014/main" id="{7556E01E-E2AD-6765-CD20-1C3F9CEA6429}"/>
-              </a:ext>
-            </a:extLst>
-          </p:cNvPr>
-          <p:cNvSpPr/>
-          <p:nvPr/>
-        </p:nvSpPr>
-        <p:spPr>
-          <a:xfrm>
-            <a:off x="10041114" y="5657783"/>
-            <a:ext cx="891461" cy="461665"/>
-          </a:xfrm>
-          <a:prstGeom prst="rect">
-            <a:avLst/>
-          </a:prstGeom>
-          <a:noFill/>
-        </p:spPr>
-        <p:txBody>
-          <a:bodyPr wrap="none" lIns="91440" tIns="45720" rIns="91440" bIns="45720">
-            <a:spAutoFit/>
-          </a:bodyPr>
-          <a:lstStyle/>
-          <a:p>
-            <a:pPr algn="ctr"/>
-            <a:r>
-              <a:rPr lang="es-ES" sz="2400" b="0" cap="none" spc="0" dirty="0">
-                <a:ln w="0"/>
-                <a:solidFill>
-                  <a:schemeClr val="tx1"/>
-                </a:solidFill>
-                <a:effectLst>
-                  <a:outerShdw blurRad="38100" dist="19050" dir="2700000" algn="tl" rotWithShape="0">
-                    <a:schemeClr val="dk1">
-                      <a:alpha val="40000"/>
-                    </a:schemeClr>
-                  </a:outerShdw>
-                </a:effectLst>
-              </a:rPr>
-              <a:t>Angel</a:t>
-            </a:r>
-          </a:p>
-        </p:txBody>
-      </p:sp>
-    </p:spTree>
-    <p:extLst>
-      <p:ext uri="{BB962C8B-B14F-4D97-AF65-F5344CB8AC3E}">
-        <p14:creationId xmlns:p14="http://schemas.microsoft.com/office/powerpoint/2010/main" val="458717184"/>
-      </p:ext>
-    </p:extLst>
-  </p:cSld>
-  <p:clrMapOvr>
-    <a:masterClrMapping/>
-  </p:clrMapOvr>
-</p:sld>
-</file>
-
-<file path=ppt/slides/slide7.xml><?xml version="1.0" encoding="utf-8"?>
-<p:sld xmlns:a="http://schemas.openxmlformats.org/drawingml/2006/main" xmlns:r="http://schemas.openxmlformats.org/officeDocument/2006/relationships" xmlns:p="http://schemas.openxmlformats.org/presentationml/2006/main">
-  <p:cSld>
-    <p:spTree>
-      <p:nvGrpSpPr>
-        <p:cNvPr id="1" name=""/>
-        <p:cNvGrpSpPr/>
-        <p:nvPr/>
-      </p:nvGrpSpPr>
-      <p:grpSpPr>
-        <a:xfrm>
-          <a:off x="0" y="0"/>
-          <a:ext cx="0" cy="0"/>
-          <a:chOff x="0" y="0"/>
-          <a:chExt cx="0" cy="0"/>
-        </a:xfrm>
-      </p:grpSpPr>
-      <p:pic>
-        <p:nvPicPr>
-          <p:cNvPr id="7" name="Imagen 6" descr="Interfaz de usuario gráfica, Aplicación, Teams&#10;&#10;Descripción generada automáticamente">
-            <a:extLst>
-              <a:ext uri="{FF2B5EF4-FFF2-40B4-BE49-F238E27FC236}">
-                <a16:creationId xmlns:a16="http://schemas.microsoft.com/office/drawing/2014/main" id="{78CEEA2E-545F-DD3B-C1A4-8FF794FF9BE4}"/>
-              </a:ext>
-            </a:extLst>
-          </p:cNvPr>
-          <p:cNvPicPr>
-            <a:picLocks noChangeAspect="1"/>
-          </p:cNvPicPr>
-          <p:nvPr/>
-        </p:nvPicPr>
-        <p:blipFill>
-          <a:blip r:embed="rId2">
-            <a:extLst>
-              <a:ext uri="{28A0092B-C50C-407E-A947-70E740481C1C}">
-                <a14:useLocalDpi xmlns:a14="http://schemas.microsoft.com/office/drawing/2010/main" val="0"/>
-              </a:ext>
-            </a:extLst>
-          </a:blip>
-          <a:stretch>
-            <a:fillRect/>
-          </a:stretch>
-        </p:blipFill>
-        <p:spPr>
-          <a:xfrm>
-            <a:off x="951345" y="1178025"/>
-            <a:ext cx="10371073" cy="4391501"/>
-          </a:xfrm>
-          <a:prstGeom prst="rect">
-            <a:avLst/>
-          </a:prstGeom>
-        </p:spPr>
-      </p:pic>
-      <p:sp>
-        <p:nvSpPr>
-          <p:cNvPr id="8" name="Rectángulo 7">
-            <a:extLst>
-              <a:ext uri="{FF2B5EF4-FFF2-40B4-BE49-F238E27FC236}">
-                <a16:creationId xmlns:a16="http://schemas.microsoft.com/office/drawing/2014/main" id="{8D5C671D-0088-58F3-31DA-22CBDB719AB1}"/>
-              </a:ext>
-            </a:extLst>
-          </p:cNvPr>
-          <p:cNvSpPr/>
-          <p:nvPr/>
-        </p:nvSpPr>
-        <p:spPr>
-          <a:xfrm>
-            <a:off x="10041114" y="5657783"/>
-            <a:ext cx="891461" cy="461665"/>
-          </a:xfrm>
-          <a:prstGeom prst="rect">
-            <a:avLst/>
-          </a:prstGeom>
-          <a:noFill/>
-        </p:spPr>
-        <p:txBody>
-          <a:bodyPr wrap="none" lIns="91440" tIns="45720" rIns="91440" bIns="45720">
-            <a:spAutoFit/>
-          </a:bodyPr>
-          <a:lstStyle/>
-          <a:p>
-            <a:pPr algn="ctr"/>
-            <a:r>
-              <a:rPr lang="es-ES" sz="2400" b="0" cap="none" spc="0" dirty="0">
-                <a:ln w="0"/>
-                <a:solidFill>
-                  <a:schemeClr val="tx1"/>
-                </a:solidFill>
-                <a:effectLst>
-                  <a:outerShdw blurRad="38100" dist="19050" dir="2700000" algn="tl" rotWithShape="0">
-                    <a:schemeClr val="dk1">
-                      <a:alpha val="40000"/>
-                    </a:schemeClr>
-                  </a:outerShdw>
-                </a:effectLst>
-              </a:rPr>
-              <a:t>Angel</a:t>
-            </a:r>
-          </a:p>
-        </p:txBody>
-      </p:sp>
-    </p:spTree>
-    <p:extLst>
-      <p:ext uri="{BB962C8B-B14F-4D97-AF65-F5344CB8AC3E}">
-        <p14:creationId xmlns:p14="http://schemas.microsoft.com/office/powerpoint/2010/main" val="17388837"/>
-      </p:ext>
-    </p:extLst>
-  </p:cSld>
-  <p:clrMapOvr>
-    <a:masterClrMapping/>
-  </p:clrMapOvr>
-</p:sld>
-</file>
-
-<file path=ppt/slides/slide8.xml><?xml version="1.0" encoding="utf-8"?>
-<p:sld xmlns:a="http://schemas.openxmlformats.org/drawingml/2006/main" xmlns:r="http://schemas.openxmlformats.org/officeDocument/2006/relationships" xmlns:p="http://schemas.openxmlformats.org/presentationml/2006/main">
-  <p:cSld>
-    <p:spTree>
-      <p:nvGrpSpPr>
-        <p:cNvPr id="1" name=""/>
-        <p:cNvGrpSpPr/>
-        <p:nvPr/>
-      </p:nvGrpSpPr>
-      <p:grpSpPr>
-        <a:xfrm>
-          <a:off x="0" y="0"/>
-          <a:ext cx="0" cy="0"/>
-          <a:chOff x="0" y="0"/>
-          <a:chExt cx="0" cy="0"/>
-        </a:xfrm>
-      </p:grpSpPr>
-      <p:pic>
-        <p:nvPicPr>
-          <p:cNvPr id="3" name="Imagen 2" descr="Interfaz de usuario gráfica, Texto, Aplicación, Chat o mensaje de texto, Sitio web&#10;&#10;Descripción generada automáticamente">
-            <a:extLst>
-              <a:ext uri="{FF2B5EF4-FFF2-40B4-BE49-F238E27FC236}">
-                <a16:creationId xmlns:a16="http://schemas.microsoft.com/office/drawing/2014/main" id="{B25E9CED-C91D-4BEA-D721-00BB86B0F810}"/>
-              </a:ext>
-            </a:extLst>
-          </p:cNvPr>
-          <p:cNvPicPr>
-            <a:picLocks noChangeAspect="1"/>
-          </p:cNvPicPr>
-          <p:nvPr/>
-        </p:nvPicPr>
-        <p:blipFill>
-          <a:blip r:embed="rId2">
-            <a:extLst>
-              <a:ext uri="{28A0092B-C50C-407E-A947-70E740481C1C}">
-                <a14:useLocalDpi xmlns:a14="http://schemas.microsoft.com/office/drawing/2010/main" val="0"/>
-              </a:ext>
-            </a:extLst>
-          </a:blip>
-          <a:stretch>
-            <a:fillRect/>
-          </a:stretch>
-        </p:blipFill>
-        <p:spPr>
-          <a:xfrm>
-            <a:off x="1600200" y="1204912"/>
-            <a:ext cx="8991600" cy="4448175"/>
-          </a:xfrm>
-          <a:prstGeom prst="rect">
-            <a:avLst/>
-          </a:prstGeom>
-        </p:spPr>
-      </p:pic>
-      <p:sp>
-        <p:nvSpPr>
-          <p:cNvPr id="4" name="Rectángulo 3">
-            <a:extLst>
-              <a:ext uri="{FF2B5EF4-FFF2-40B4-BE49-F238E27FC236}">
-                <a16:creationId xmlns:a16="http://schemas.microsoft.com/office/drawing/2014/main" id="{DA0C9F06-04D5-1C0A-F0BA-72D56FAC2412}"/>
-              </a:ext>
-            </a:extLst>
-          </p:cNvPr>
-          <p:cNvSpPr/>
-          <p:nvPr/>
-        </p:nvSpPr>
-        <p:spPr>
-          <a:xfrm>
-            <a:off x="9889566" y="5657783"/>
-            <a:ext cx="1194558" cy="461665"/>
-          </a:xfrm>
-          <a:prstGeom prst="rect">
-            <a:avLst/>
-          </a:prstGeom>
-          <a:noFill/>
-        </p:spPr>
-        <p:txBody>
-          <a:bodyPr wrap="none" lIns="91440" tIns="45720" rIns="91440" bIns="45720">
-            <a:spAutoFit/>
-          </a:bodyPr>
-          <a:lstStyle/>
-          <a:p>
-            <a:pPr algn="ctr"/>
-            <a:r>
-              <a:rPr lang="es-ES" sz="2400" b="0" cap="none" spc="0" dirty="0">
-                <a:ln w="0"/>
-                <a:solidFill>
-                  <a:schemeClr val="tx1"/>
-                </a:solidFill>
-                <a:effectLst>
-                  <a:outerShdw blurRad="38100" dist="19050" dir="2700000" algn="tl" rotWithShape="0">
-                    <a:schemeClr val="dk1">
-                      <a:alpha val="40000"/>
-                    </a:schemeClr>
-                  </a:outerShdw>
-                </a:effectLst>
-              </a:rPr>
-              <a:t>Damaris</a:t>
-            </a:r>
-          </a:p>
-        </p:txBody>
-      </p:sp>
-    </p:spTree>
-    <p:extLst>
-      <p:ext uri="{BB962C8B-B14F-4D97-AF65-F5344CB8AC3E}">
-        <p14:creationId xmlns:p14="http://schemas.microsoft.com/office/powerpoint/2010/main" val="1391562476"/>
-      </p:ext>
-    </p:extLst>
-  </p:cSld>
-  <p:clrMapOvr>
-    <a:masterClrMapping/>
-  </p:clrMapOvr>
-</p:sld>
-</file>
-
-<file path=ppt/slides/slide9.xml><?xml version="1.0" encoding="utf-8"?>
 <p:sld xmlns:a="http://schemas.openxmlformats.org/drawingml/2006/main" xmlns:r="http://schemas.openxmlformats.org/officeDocument/2006/relationships" xmlns:p="http://schemas.openxmlformats.org/presentationml/2006/main">
   <p:cSld>
     <p:bg>
@@ -8843,6 +8708,750 @@
       <p:bldP spid="2" grpId="0"/>
     </p:bldLst>
   </p:timing>
+</p:sld>
+</file>
+
+<file path=ppt/slides/slide6.xml><?xml version="1.0" encoding="utf-8"?>
+<p:sld xmlns:a="http://schemas.openxmlformats.org/drawingml/2006/main" xmlns:r="http://schemas.openxmlformats.org/officeDocument/2006/relationships" xmlns:p="http://schemas.openxmlformats.org/presentationml/2006/main">
+  <p:cSld>
+    <p:spTree>
+      <p:nvGrpSpPr>
+        <p:cNvPr id="1" name=""/>
+        <p:cNvGrpSpPr/>
+        <p:nvPr/>
+      </p:nvGrpSpPr>
+      <p:grpSpPr>
+        <a:xfrm>
+          <a:off x="0" y="0"/>
+          <a:ext cx="0" cy="0"/>
+          <a:chOff x="0" y="0"/>
+          <a:chExt cx="0" cy="0"/>
+        </a:xfrm>
+      </p:grpSpPr>
+      <p:pic>
+        <p:nvPicPr>
+          <p:cNvPr id="3" name="Imagen 2">
+            <a:extLst>
+              <a:ext uri="{FF2B5EF4-FFF2-40B4-BE49-F238E27FC236}">
+                <a16:creationId xmlns:a16="http://schemas.microsoft.com/office/drawing/2014/main" id="{E167D06C-DEFF-6113-02A2-8780E57B6F16}"/>
+              </a:ext>
+            </a:extLst>
+          </p:cNvPr>
+          <p:cNvPicPr>
+            <a:picLocks noChangeAspect="1"/>
+          </p:cNvPicPr>
+          <p:nvPr/>
+        </p:nvPicPr>
+        <p:blipFill>
+          <a:blip r:embed="rId2"/>
+          <a:stretch>
+            <a:fillRect/>
+          </a:stretch>
+        </p:blipFill>
+        <p:spPr>
+          <a:xfrm>
+            <a:off x="2326817" y="760779"/>
+            <a:ext cx="2319771" cy="4554747"/>
+          </a:xfrm>
+          <a:prstGeom prst="rect">
+            <a:avLst/>
+          </a:prstGeom>
+        </p:spPr>
+      </p:pic>
+      <p:pic>
+        <p:nvPicPr>
+          <p:cNvPr id="5" name="Imagen 4">
+            <a:extLst>
+              <a:ext uri="{FF2B5EF4-FFF2-40B4-BE49-F238E27FC236}">
+                <a16:creationId xmlns:a16="http://schemas.microsoft.com/office/drawing/2014/main" id="{4BAEC1FB-740C-CF5C-7F24-3613ED81AF17}"/>
+              </a:ext>
+            </a:extLst>
+          </p:cNvPr>
+          <p:cNvPicPr>
+            <a:picLocks noChangeAspect="1"/>
+          </p:cNvPicPr>
+          <p:nvPr/>
+        </p:nvPicPr>
+        <p:blipFill>
+          <a:blip r:embed="rId3"/>
+          <a:stretch>
+            <a:fillRect/>
+          </a:stretch>
+        </p:blipFill>
+        <p:spPr>
+          <a:xfrm>
+            <a:off x="6962024" y="760779"/>
+            <a:ext cx="2358501" cy="4554747"/>
+          </a:xfrm>
+          <a:prstGeom prst="rect">
+            <a:avLst/>
+          </a:prstGeom>
+        </p:spPr>
+      </p:pic>
+      <p:sp>
+        <p:nvSpPr>
+          <p:cNvPr id="6" name="Rectángulo 5">
+            <a:extLst>
+              <a:ext uri="{FF2B5EF4-FFF2-40B4-BE49-F238E27FC236}">
+                <a16:creationId xmlns:a16="http://schemas.microsoft.com/office/drawing/2014/main" id="{44242DFE-0C4A-9969-4B61-8CAF3E7F6619}"/>
+              </a:ext>
+            </a:extLst>
+          </p:cNvPr>
+          <p:cNvSpPr/>
+          <p:nvPr/>
+        </p:nvSpPr>
+        <p:spPr>
+          <a:xfrm>
+            <a:off x="2445216" y="5315526"/>
+            <a:ext cx="2201372" cy="461665"/>
+          </a:xfrm>
+          <a:prstGeom prst="rect">
+            <a:avLst/>
+          </a:prstGeom>
+          <a:noFill/>
+        </p:spPr>
+        <p:txBody>
+          <a:bodyPr wrap="none" lIns="91440" tIns="45720" rIns="91440" bIns="45720">
+            <a:spAutoFit/>
+          </a:bodyPr>
+          <a:lstStyle/>
+          <a:p>
+            <a:pPr algn="ctr"/>
+            <a:r>
+              <a:rPr lang="es-ES" sz="2400" b="0" cap="none" spc="0" dirty="0">
+                <a:ln w="0"/>
+                <a:solidFill>
+                  <a:schemeClr val="tx1"/>
+                </a:solidFill>
+                <a:effectLst>
+                  <a:outerShdw blurRad="38100" dist="19050" dir="2700000" algn="tl" rotWithShape="0">
+                    <a:schemeClr val="dk1">
+                      <a:alpha val="40000"/>
+                    </a:schemeClr>
+                  </a:outerShdw>
+                </a:effectLst>
+              </a:rPr>
+              <a:t>Pantalla de inicio</a:t>
+            </a:r>
+          </a:p>
+        </p:txBody>
+      </p:sp>
+      <p:sp>
+        <p:nvSpPr>
+          <p:cNvPr id="7" name="Rectángulo 6">
+            <a:extLst>
+              <a:ext uri="{FF2B5EF4-FFF2-40B4-BE49-F238E27FC236}">
+                <a16:creationId xmlns:a16="http://schemas.microsoft.com/office/drawing/2014/main" id="{E9A84149-AC6E-9D6A-72FC-3674FF9603D0}"/>
+              </a:ext>
+            </a:extLst>
+          </p:cNvPr>
+          <p:cNvSpPr/>
+          <p:nvPr/>
+        </p:nvSpPr>
+        <p:spPr>
+          <a:xfrm>
+            <a:off x="7194563" y="5315525"/>
+            <a:ext cx="2050562" cy="461665"/>
+          </a:xfrm>
+          <a:prstGeom prst="rect">
+            <a:avLst/>
+          </a:prstGeom>
+          <a:noFill/>
+        </p:spPr>
+        <p:txBody>
+          <a:bodyPr wrap="none" lIns="91440" tIns="45720" rIns="91440" bIns="45720">
+            <a:spAutoFit/>
+          </a:bodyPr>
+          <a:lstStyle/>
+          <a:p>
+            <a:pPr algn="ctr"/>
+            <a:r>
+              <a:rPr lang="es-ES" sz="2400" b="0" cap="none" spc="0" dirty="0">
+                <a:ln w="0"/>
+                <a:solidFill>
+                  <a:schemeClr val="tx1"/>
+                </a:solidFill>
+                <a:effectLst>
+                  <a:outerShdw blurRad="38100" dist="19050" dir="2700000" algn="tl" rotWithShape="0">
+                    <a:schemeClr val="dk1">
+                      <a:alpha val="40000"/>
+                    </a:schemeClr>
+                  </a:outerShdw>
+                </a:effectLst>
+              </a:rPr>
+              <a:t>Inicio de sesión</a:t>
+            </a:r>
+          </a:p>
+        </p:txBody>
+      </p:sp>
+    </p:spTree>
+    <p:extLst>
+      <p:ext uri="{BB962C8B-B14F-4D97-AF65-F5344CB8AC3E}">
+        <p14:creationId xmlns:p14="http://schemas.microsoft.com/office/powerpoint/2010/main" val="2611932602"/>
+      </p:ext>
+    </p:extLst>
+  </p:cSld>
+  <p:clrMapOvr>
+    <a:masterClrMapping/>
+  </p:clrMapOvr>
+</p:sld>
+</file>
+
+<file path=ppt/slides/slide7.xml><?xml version="1.0" encoding="utf-8"?>
+<p:sld xmlns:a="http://schemas.openxmlformats.org/drawingml/2006/main" xmlns:r="http://schemas.openxmlformats.org/officeDocument/2006/relationships" xmlns:p="http://schemas.openxmlformats.org/presentationml/2006/main">
+  <p:cSld>
+    <p:spTree>
+      <p:nvGrpSpPr>
+        <p:cNvPr id="1" name=""/>
+        <p:cNvGrpSpPr/>
+        <p:nvPr/>
+      </p:nvGrpSpPr>
+      <p:grpSpPr>
+        <a:xfrm>
+          <a:off x="0" y="0"/>
+          <a:ext cx="0" cy="0"/>
+          <a:chOff x="0" y="0"/>
+          <a:chExt cx="0" cy="0"/>
+        </a:xfrm>
+      </p:grpSpPr>
+      <p:pic>
+        <p:nvPicPr>
+          <p:cNvPr id="3" name="Imagen 2">
+            <a:extLst>
+              <a:ext uri="{FF2B5EF4-FFF2-40B4-BE49-F238E27FC236}">
+                <a16:creationId xmlns:a16="http://schemas.microsoft.com/office/drawing/2014/main" id="{BB7D996A-0374-F0AC-AC1D-9AF81A79439D}"/>
+              </a:ext>
+            </a:extLst>
+          </p:cNvPr>
+          <p:cNvPicPr>
+            <a:picLocks noChangeAspect="1"/>
+          </p:cNvPicPr>
+          <p:nvPr/>
+        </p:nvPicPr>
+        <p:blipFill>
+          <a:blip r:embed="rId2"/>
+          <a:stretch>
+            <a:fillRect/>
+          </a:stretch>
+        </p:blipFill>
+        <p:spPr>
+          <a:xfrm>
+            <a:off x="2696638" y="886689"/>
+            <a:ext cx="2494198" cy="4846971"/>
+          </a:xfrm>
+          <a:prstGeom prst="rect">
+            <a:avLst/>
+          </a:prstGeom>
+        </p:spPr>
+      </p:pic>
+      <p:pic>
+        <p:nvPicPr>
+          <p:cNvPr id="5" name="Imagen 4">
+            <a:extLst>
+              <a:ext uri="{FF2B5EF4-FFF2-40B4-BE49-F238E27FC236}">
+                <a16:creationId xmlns:a16="http://schemas.microsoft.com/office/drawing/2014/main" id="{BE6080B0-D5EE-D926-03B7-DBB16644A73E}"/>
+              </a:ext>
+            </a:extLst>
+          </p:cNvPr>
+          <p:cNvPicPr>
+            <a:picLocks noChangeAspect="1"/>
+          </p:cNvPicPr>
+          <p:nvPr/>
+        </p:nvPicPr>
+        <p:blipFill>
+          <a:blip r:embed="rId3"/>
+          <a:stretch>
+            <a:fillRect/>
+          </a:stretch>
+        </p:blipFill>
+        <p:spPr>
+          <a:xfrm>
+            <a:off x="6474608" y="886689"/>
+            <a:ext cx="2506833" cy="4846971"/>
+          </a:xfrm>
+          <a:prstGeom prst="rect">
+            <a:avLst/>
+          </a:prstGeom>
+        </p:spPr>
+      </p:pic>
+      <p:sp>
+        <p:nvSpPr>
+          <p:cNvPr id="6" name="Rectángulo 5">
+            <a:extLst>
+              <a:ext uri="{FF2B5EF4-FFF2-40B4-BE49-F238E27FC236}">
+                <a16:creationId xmlns:a16="http://schemas.microsoft.com/office/drawing/2014/main" id="{6E3A68D5-0ACA-FB8A-39E9-10C12FC8BC7C}"/>
+              </a:ext>
+            </a:extLst>
+          </p:cNvPr>
+          <p:cNvSpPr/>
+          <p:nvPr/>
+        </p:nvSpPr>
+        <p:spPr>
+          <a:xfrm>
+            <a:off x="3249637" y="5733660"/>
+            <a:ext cx="1388201" cy="461665"/>
+          </a:xfrm>
+          <a:prstGeom prst="rect">
+            <a:avLst/>
+          </a:prstGeom>
+          <a:noFill/>
+        </p:spPr>
+        <p:txBody>
+          <a:bodyPr wrap="none" lIns="91440" tIns="45720" rIns="91440" bIns="45720">
+            <a:spAutoFit/>
+          </a:bodyPr>
+          <a:lstStyle/>
+          <a:p>
+            <a:pPr algn="ctr"/>
+            <a:r>
+              <a:rPr lang="es-ES" sz="2400" b="0" cap="none" spc="0" dirty="0">
+                <a:ln w="0"/>
+                <a:solidFill>
+                  <a:schemeClr val="tx1"/>
+                </a:solidFill>
+                <a:effectLst>
+                  <a:outerShdw blurRad="38100" dist="19050" dir="2700000" algn="tl" rotWithShape="0">
+                    <a:schemeClr val="dk1">
+                      <a:alpha val="40000"/>
+                    </a:schemeClr>
+                  </a:outerShdw>
+                </a:effectLst>
+              </a:rPr>
+              <a:t>Instagram</a:t>
+            </a:r>
+          </a:p>
+        </p:txBody>
+      </p:sp>
+      <p:sp>
+        <p:nvSpPr>
+          <p:cNvPr id="7" name="Rectángulo 6">
+            <a:extLst>
+              <a:ext uri="{FF2B5EF4-FFF2-40B4-BE49-F238E27FC236}">
+                <a16:creationId xmlns:a16="http://schemas.microsoft.com/office/drawing/2014/main" id="{F0A34C58-A9CF-D607-FCC3-6F52018F0BA6}"/>
+              </a:ext>
+            </a:extLst>
+          </p:cNvPr>
+          <p:cNvSpPr/>
+          <p:nvPr/>
+        </p:nvSpPr>
+        <p:spPr>
+          <a:xfrm>
+            <a:off x="7054443" y="5740478"/>
+            <a:ext cx="1347164" cy="461665"/>
+          </a:xfrm>
+          <a:prstGeom prst="rect">
+            <a:avLst/>
+          </a:prstGeom>
+          <a:noFill/>
+        </p:spPr>
+        <p:txBody>
+          <a:bodyPr wrap="none" lIns="91440" tIns="45720" rIns="91440" bIns="45720">
+            <a:spAutoFit/>
+          </a:bodyPr>
+          <a:lstStyle/>
+          <a:p>
+            <a:pPr algn="ctr"/>
+            <a:r>
+              <a:rPr lang="es-ES" sz="2400" b="0" cap="none" spc="0" dirty="0">
+                <a:ln w="0"/>
+                <a:solidFill>
+                  <a:schemeClr val="tx1"/>
+                </a:solidFill>
+                <a:effectLst>
+                  <a:outerShdw blurRad="38100" dist="19050" dir="2700000" algn="tl" rotWithShape="0">
+                    <a:schemeClr val="dk1">
+                      <a:alpha val="40000"/>
+                    </a:schemeClr>
+                  </a:outerShdw>
+                </a:effectLst>
+              </a:rPr>
+              <a:t>Facebook</a:t>
+            </a:r>
+          </a:p>
+        </p:txBody>
+      </p:sp>
+    </p:spTree>
+    <p:extLst>
+      <p:ext uri="{BB962C8B-B14F-4D97-AF65-F5344CB8AC3E}">
+        <p14:creationId xmlns:p14="http://schemas.microsoft.com/office/powerpoint/2010/main" val="1732374878"/>
+      </p:ext>
+    </p:extLst>
+  </p:cSld>
+  <p:clrMapOvr>
+    <a:masterClrMapping/>
+  </p:clrMapOvr>
+</p:sld>
+</file>
+
+<file path=ppt/slides/slide8.xml><?xml version="1.0" encoding="utf-8"?>
+<p:sld xmlns:a="http://schemas.openxmlformats.org/drawingml/2006/main" xmlns:r="http://schemas.openxmlformats.org/officeDocument/2006/relationships" xmlns:p="http://schemas.openxmlformats.org/presentationml/2006/main">
+  <p:cSld>
+    <p:spTree>
+      <p:nvGrpSpPr>
+        <p:cNvPr id="1" name=""/>
+        <p:cNvGrpSpPr/>
+        <p:nvPr/>
+      </p:nvGrpSpPr>
+      <p:grpSpPr>
+        <a:xfrm>
+          <a:off x="0" y="0"/>
+          <a:ext cx="0" cy="0"/>
+          <a:chOff x="0" y="0"/>
+          <a:chExt cx="0" cy="0"/>
+        </a:xfrm>
+      </p:grpSpPr>
+      <p:pic>
+        <p:nvPicPr>
+          <p:cNvPr id="3" name="Imagen 2">
+            <a:extLst>
+              <a:ext uri="{FF2B5EF4-FFF2-40B4-BE49-F238E27FC236}">
+                <a16:creationId xmlns:a16="http://schemas.microsoft.com/office/drawing/2014/main" id="{252CBD69-55BB-E7E1-31E4-E91135A8BF12}"/>
+              </a:ext>
+            </a:extLst>
+          </p:cNvPr>
+          <p:cNvPicPr>
+            <a:picLocks noChangeAspect="1"/>
+          </p:cNvPicPr>
+          <p:nvPr/>
+        </p:nvPicPr>
+        <p:blipFill>
+          <a:blip r:embed="rId2"/>
+          <a:stretch>
+            <a:fillRect/>
+          </a:stretch>
+        </p:blipFill>
+        <p:spPr>
+          <a:xfrm>
+            <a:off x="2399362" y="726357"/>
+            <a:ext cx="2440492" cy="4926298"/>
+          </a:xfrm>
+          <a:prstGeom prst="rect">
+            <a:avLst/>
+          </a:prstGeom>
+        </p:spPr>
+      </p:pic>
+      <p:pic>
+        <p:nvPicPr>
+          <p:cNvPr id="5" name="Imagen 4">
+            <a:extLst>
+              <a:ext uri="{FF2B5EF4-FFF2-40B4-BE49-F238E27FC236}">
+                <a16:creationId xmlns:a16="http://schemas.microsoft.com/office/drawing/2014/main" id="{2191E103-AD6E-8692-594B-8EE4CA06D72E}"/>
+              </a:ext>
+            </a:extLst>
+          </p:cNvPr>
+          <p:cNvPicPr>
+            <a:picLocks noChangeAspect="1"/>
+          </p:cNvPicPr>
+          <p:nvPr/>
+        </p:nvPicPr>
+        <p:blipFill>
+          <a:blip r:embed="rId3"/>
+          <a:stretch>
+            <a:fillRect/>
+          </a:stretch>
+        </p:blipFill>
+        <p:spPr>
+          <a:xfrm>
+            <a:off x="6813240" y="726357"/>
+            <a:ext cx="2485986" cy="4926298"/>
+          </a:xfrm>
+          <a:prstGeom prst="rect">
+            <a:avLst/>
+          </a:prstGeom>
+        </p:spPr>
+      </p:pic>
+      <p:sp>
+        <p:nvSpPr>
+          <p:cNvPr id="6" name="Rectángulo 5">
+            <a:extLst>
+              <a:ext uri="{FF2B5EF4-FFF2-40B4-BE49-F238E27FC236}">
+                <a16:creationId xmlns:a16="http://schemas.microsoft.com/office/drawing/2014/main" id="{9DDFABCB-92FB-04F7-6021-39ED110947EF}"/>
+              </a:ext>
+            </a:extLst>
+          </p:cNvPr>
+          <p:cNvSpPr/>
+          <p:nvPr/>
+        </p:nvSpPr>
+        <p:spPr>
+          <a:xfrm>
+            <a:off x="2623184" y="5652655"/>
+            <a:ext cx="1992853" cy="461665"/>
+          </a:xfrm>
+          <a:prstGeom prst="rect">
+            <a:avLst/>
+          </a:prstGeom>
+          <a:noFill/>
+        </p:spPr>
+        <p:txBody>
+          <a:bodyPr wrap="none" lIns="91440" tIns="45720" rIns="91440" bIns="45720">
+            <a:spAutoFit/>
+          </a:bodyPr>
+          <a:lstStyle/>
+          <a:p>
+            <a:pPr algn="ctr"/>
+            <a:r>
+              <a:rPr lang="es-ES" sz="2400" b="0" cap="none" spc="0" dirty="0">
+                <a:ln w="0"/>
+                <a:solidFill>
+                  <a:schemeClr val="tx1"/>
+                </a:solidFill>
+                <a:effectLst>
+                  <a:outerShdw blurRad="38100" dist="19050" dir="2700000" algn="tl" rotWithShape="0">
+                    <a:schemeClr val="dk1">
+                      <a:alpha val="40000"/>
+                    </a:schemeClr>
+                  </a:outerShdw>
+                </a:effectLst>
+              </a:rPr>
+              <a:t>Menú principal</a:t>
+            </a:r>
+          </a:p>
+        </p:txBody>
+      </p:sp>
+      <p:sp>
+        <p:nvSpPr>
+          <p:cNvPr id="7" name="Rectángulo 6">
+            <a:extLst>
+              <a:ext uri="{FF2B5EF4-FFF2-40B4-BE49-F238E27FC236}">
+                <a16:creationId xmlns:a16="http://schemas.microsoft.com/office/drawing/2014/main" id="{9F10F1B3-ECE8-08AE-95D5-17F5146978DE}"/>
+              </a:ext>
+            </a:extLst>
+          </p:cNvPr>
+          <p:cNvSpPr/>
+          <p:nvPr/>
+        </p:nvSpPr>
+        <p:spPr>
+          <a:xfrm>
+            <a:off x="6608725" y="5669978"/>
+            <a:ext cx="2895023" cy="461665"/>
+          </a:xfrm>
+          <a:prstGeom prst="rect">
+            <a:avLst/>
+          </a:prstGeom>
+          <a:noFill/>
+        </p:spPr>
+        <p:txBody>
+          <a:bodyPr wrap="none" lIns="91440" tIns="45720" rIns="91440" bIns="45720">
+            <a:spAutoFit/>
+          </a:bodyPr>
+          <a:lstStyle/>
+          <a:p>
+            <a:pPr algn="ctr"/>
+            <a:r>
+              <a:rPr lang="es-ES" sz="2400" b="0" cap="none" spc="0" dirty="0">
+                <a:ln w="0"/>
+                <a:solidFill>
+                  <a:schemeClr val="tx1"/>
+                </a:solidFill>
+                <a:effectLst>
+                  <a:outerShdw blurRad="38100" dist="19050" dir="2700000" algn="tl" rotWithShape="0">
+                    <a:schemeClr val="dk1">
+                      <a:alpha val="40000"/>
+                    </a:schemeClr>
+                  </a:outerShdw>
+                </a:effectLst>
+              </a:rPr>
+              <a:t>Catalogo de productos</a:t>
+            </a:r>
+          </a:p>
+        </p:txBody>
+      </p:sp>
+    </p:spTree>
+    <p:extLst>
+      <p:ext uri="{BB962C8B-B14F-4D97-AF65-F5344CB8AC3E}">
+        <p14:creationId xmlns:p14="http://schemas.microsoft.com/office/powerpoint/2010/main" val="4239082882"/>
+      </p:ext>
+    </p:extLst>
+  </p:cSld>
+  <p:clrMapOvr>
+    <a:masterClrMapping/>
+  </p:clrMapOvr>
+</p:sld>
+</file>
+
+<file path=ppt/slides/slide9.xml><?xml version="1.0" encoding="utf-8"?>
+<p:sld xmlns:a="http://schemas.openxmlformats.org/drawingml/2006/main" xmlns:r="http://schemas.openxmlformats.org/officeDocument/2006/relationships" xmlns:p="http://schemas.openxmlformats.org/presentationml/2006/main">
+  <p:cSld>
+    <p:spTree>
+      <p:nvGrpSpPr>
+        <p:cNvPr id="1" name=""/>
+        <p:cNvGrpSpPr/>
+        <p:nvPr/>
+      </p:nvGrpSpPr>
+      <p:grpSpPr>
+        <a:xfrm>
+          <a:off x="0" y="0"/>
+          <a:ext cx="0" cy="0"/>
+          <a:chOff x="0" y="0"/>
+          <a:chExt cx="0" cy="0"/>
+        </a:xfrm>
+      </p:grpSpPr>
+      <p:pic>
+        <p:nvPicPr>
+          <p:cNvPr id="3" name="Imagen 2">
+            <a:extLst>
+              <a:ext uri="{FF2B5EF4-FFF2-40B4-BE49-F238E27FC236}">
+                <a16:creationId xmlns:a16="http://schemas.microsoft.com/office/drawing/2014/main" id="{FCF3E918-6120-FEF2-4FB5-71728C193DDF}"/>
+              </a:ext>
+            </a:extLst>
+          </p:cNvPr>
+          <p:cNvPicPr>
+            <a:picLocks noChangeAspect="1"/>
+          </p:cNvPicPr>
+          <p:nvPr/>
+        </p:nvPicPr>
+        <p:blipFill>
+          <a:blip r:embed="rId2"/>
+          <a:stretch>
+            <a:fillRect/>
+          </a:stretch>
+        </p:blipFill>
+        <p:spPr>
+          <a:xfrm>
+            <a:off x="7300850" y="848786"/>
+            <a:ext cx="2355602" cy="4613564"/>
+          </a:xfrm>
+          <a:prstGeom prst="rect">
+            <a:avLst/>
+          </a:prstGeom>
+        </p:spPr>
+      </p:pic>
+      <p:pic>
+        <p:nvPicPr>
+          <p:cNvPr id="4" name="Imagen 3">
+            <a:extLst>
+              <a:ext uri="{FF2B5EF4-FFF2-40B4-BE49-F238E27FC236}">
+                <a16:creationId xmlns:a16="http://schemas.microsoft.com/office/drawing/2014/main" id="{766BDBC5-B82F-13E9-DB15-C32936F0BCF6}"/>
+              </a:ext>
+            </a:extLst>
+          </p:cNvPr>
+          <p:cNvPicPr>
+            <a:picLocks noChangeAspect="1"/>
+          </p:cNvPicPr>
+          <p:nvPr/>
+        </p:nvPicPr>
+        <p:blipFill>
+          <a:blip r:embed="rId3"/>
+          <a:stretch>
+            <a:fillRect/>
+          </a:stretch>
+        </p:blipFill>
+        <p:spPr>
+          <a:xfrm>
+            <a:off x="2682989" y="848786"/>
+            <a:ext cx="2208162" cy="4493491"/>
+          </a:xfrm>
+          <a:prstGeom prst="rect">
+            <a:avLst/>
+          </a:prstGeom>
+        </p:spPr>
+      </p:pic>
+      <p:sp>
+        <p:nvSpPr>
+          <p:cNvPr id="5" name="Rectángulo 4">
+            <a:extLst>
+              <a:ext uri="{FF2B5EF4-FFF2-40B4-BE49-F238E27FC236}">
+                <a16:creationId xmlns:a16="http://schemas.microsoft.com/office/drawing/2014/main" id="{A2E278E6-2111-A91D-9E43-1780139F1EFC}"/>
+              </a:ext>
+            </a:extLst>
+          </p:cNvPr>
+          <p:cNvSpPr/>
+          <p:nvPr/>
+        </p:nvSpPr>
+        <p:spPr>
+          <a:xfrm>
+            <a:off x="2751810" y="5547549"/>
+            <a:ext cx="2310249" cy="461665"/>
+          </a:xfrm>
+          <a:prstGeom prst="rect">
+            <a:avLst/>
+          </a:prstGeom>
+          <a:noFill/>
+        </p:spPr>
+        <p:txBody>
+          <a:bodyPr wrap="none" lIns="91440" tIns="45720" rIns="91440" bIns="45720">
+            <a:spAutoFit/>
+          </a:bodyPr>
+          <a:lstStyle/>
+          <a:p>
+            <a:pPr algn="ctr"/>
+            <a:r>
+              <a:rPr lang="es-ES" sz="2400" b="0" cap="none" spc="0" dirty="0">
+                <a:ln w="0"/>
+                <a:solidFill>
+                  <a:schemeClr val="tx1"/>
+                </a:solidFill>
+                <a:effectLst>
+                  <a:outerShdw blurRad="38100" dist="19050" dir="2700000" algn="tl" rotWithShape="0">
+                    <a:schemeClr val="dk1">
+                      <a:alpha val="40000"/>
+                    </a:schemeClr>
+                  </a:outerShdw>
+                </a:effectLst>
+              </a:rPr>
+              <a:t>Cuenta del cliente</a:t>
+            </a:r>
+          </a:p>
+        </p:txBody>
+      </p:sp>
+      <p:sp>
+        <p:nvSpPr>
+          <p:cNvPr id="6" name="Rectángulo 5">
+            <a:extLst>
+              <a:ext uri="{FF2B5EF4-FFF2-40B4-BE49-F238E27FC236}">
+                <a16:creationId xmlns:a16="http://schemas.microsoft.com/office/drawing/2014/main" id="{7234AB12-96A2-ACD2-E0F7-297CE3706C1E}"/>
+              </a:ext>
+            </a:extLst>
+          </p:cNvPr>
+          <p:cNvSpPr/>
+          <p:nvPr/>
+        </p:nvSpPr>
+        <p:spPr>
+          <a:xfrm>
+            <a:off x="6901709" y="5547548"/>
+            <a:ext cx="3108543" cy="461665"/>
+          </a:xfrm>
+          <a:prstGeom prst="rect">
+            <a:avLst/>
+          </a:prstGeom>
+          <a:noFill/>
+        </p:spPr>
+        <p:txBody>
+          <a:bodyPr wrap="none" lIns="91440" tIns="45720" rIns="91440" bIns="45720">
+            <a:spAutoFit/>
+          </a:bodyPr>
+          <a:lstStyle/>
+          <a:p>
+            <a:pPr algn="ctr"/>
+            <a:r>
+              <a:rPr lang="es-ES" sz="2400" b="0" cap="none" spc="0" dirty="0">
+                <a:ln w="0"/>
+                <a:solidFill>
+                  <a:schemeClr val="tx1"/>
+                </a:solidFill>
+                <a:effectLst>
+                  <a:outerShdw blurRad="38100" dist="19050" dir="2700000" algn="tl" rotWithShape="0">
+                    <a:schemeClr val="dk1">
+                      <a:alpha val="40000"/>
+                    </a:schemeClr>
+                  </a:outerShdw>
+                </a:effectLst>
+              </a:rPr>
+              <a:t>Configuración de cuenta</a:t>
+            </a:r>
+          </a:p>
+        </p:txBody>
+      </p:sp>
+    </p:spTree>
+    <p:extLst>
+      <p:ext uri="{BB962C8B-B14F-4D97-AF65-F5344CB8AC3E}">
+        <p14:creationId xmlns:p14="http://schemas.microsoft.com/office/powerpoint/2010/main" val="816740263"/>
+      </p:ext>
+    </p:extLst>
+  </p:cSld>
+  <p:clrMapOvr>
+    <a:masterClrMapping/>
+  </p:clrMapOvr>
 </p:sld>
 </file>
 

</xml_diff>